<commit_message>
Modification du diagrammes de classes
</commit_message>
<xml_diff>
--- a/Soutenance_miProjet.pptx
+++ b/Soutenance_miProjet.pptx
@@ -201,7 +201,7 @@
           <a:p>
             <a:fld id="{33A439F9-8DCE-794B-AB34-EBB3DE4A108F}" type="datetimeFigureOut">
               <a:rPr lang="fr-FR" smtClean="0"/>
-              <a:t>16/12/2013</a:t>
+              <a:t>17/12/2013</a:t>
             </a:fld>
             <a:endParaRPr lang="fr-FR"/>
           </a:p>
@@ -360,7 +360,7 @@
           <a:p>
             <a:fld id="{B956A79E-FAC0-1942-8597-B8D8938A06DC}" type="slidenum">
               <a:rPr lang="fr-FR" smtClean="0"/>
-              <a:t>‹N°›</a:t>
+              <a:t>‹#›</a:t>
             </a:fld>
             <a:endParaRPr lang="fr-FR"/>
           </a:p>
@@ -922,7 +922,7 @@
             <a:pPr eaLnBrk="1" latinLnBrk="0" hangingPunct="1"/>
             <a:fld id="{7E67FBA8-66D5-45E8-A9CB-6E4000F8E69E}" type="datetime1">
               <a:rPr lang="en-US" smtClean="0"/>
-              <a:t>12/16/2013</a:t>
+              <a:t>17/12/2013</a:t>
             </a:fld>
             <a:endParaRPr lang="en-US"/>
           </a:p>
@@ -968,7 +968,7 @@
           <a:p>
             <a:fld id="{7F5CE407-6216-4202-80E4-A30DC2F709B2}" type="slidenum">
               <a:rPr lang="en-US" smtClean="0"/>
-              <a:t>‹N°›</a:t>
+              <a:t>‹#›</a:t>
             </a:fld>
             <a:endParaRPr lang="en-US"/>
           </a:p>
@@ -1055,7 +1055,7 @@
           <a:p>
             <a:fld id="{3FFF98ED-0755-4755-8632-F7C31FD349F7}" type="datetime1">
               <a:rPr lang="en-US" smtClean="0"/>
-              <a:t>12/16/2013</a:t>
+              <a:t>17/12/2013</a:t>
             </a:fld>
             <a:endParaRPr lang="en-US"/>
           </a:p>
@@ -1101,7 +1101,7 @@
           <a:p>
             <a:fld id="{886BB73A-582F-4420-9A14-CB10A2B2E5E8}" type="slidenum">
               <a:rPr lang="en-US" smtClean="0"/>
-              <a:t>‹N°›</a:t>
+              <a:t>‹#›</a:t>
             </a:fld>
             <a:endParaRPr lang="en-US"/>
           </a:p>
@@ -1364,7 +1364,7 @@
           <a:p>
             <a:fld id="{5A1A947A-C5EE-4C17-A02D-6B0D5BC94F10}" type="datetime1">
               <a:rPr lang="en-US" smtClean="0"/>
-              <a:t>12/16/2013</a:t>
+              <a:t>17/12/2013</a:t>
             </a:fld>
             <a:endParaRPr lang="en-US"/>
           </a:p>
@@ -1410,7 +1410,7 @@
           <a:p>
             <a:fld id="{7F5CE407-6216-4202-80E4-A30DC2F709B2}" type="slidenum">
               <a:rPr lang="en-US" smtClean="0"/>
-              <a:t>‹N°›</a:t>
+              <a:t>‹#›</a:t>
             </a:fld>
             <a:endParaRPr lang="en-US"/>
           </a:p>
@@ -1593,7 +1593,7 @@
           <a:p>
             <a:fld id="{A0CE5133-35BD-4B9D-A767-7CFF8D1AB082}" type="datetime1">
               <a:rPr lang="en-US" smtClean="0"/>
-              <a:t>12/16/2013</a:t>
+              <a:t>17/12/2013</a:t>
             </a:fld>
             <a:endParaRPr lang="en-US"/>
           </a:p>
@@ -1639,7 +1639,7 @@
           <a:p>
             <a:fld id="{886BB73A-582F-4420-9A14-CB10A2B2E5E8}" type="slidenum">
               <a:rPr lang="en-US" smtClean="0"/>
-              <a:t>‹N°›</a:t>
+              <a:t>‹#›</a:t>
             </a:fld>
             <a:endParaRPr lang="en-US"/>
           </a:p>
@@ -1867,7 +1867,7 @@
           <a:p>
             <a:fld id="{DD548307-BFB2-4F00-9A09-ABF429E2346C}" type="datetime1">
               <a:rPr lang="en-US" smtClean="0"/>
-              <a:t>12/16/2013</a:t>
+              <a:t>17/12/2013</a:t>
             </a:fld>
             <a:endParaRPr lang="en-US"/>
           </a:p>
@@ -1913,7 +1913,7 @@
           <a:p>
             <a:fld id="{886BB73A-582F-4420-9A14-CB10A2B2E5E8}" type="slidenum">
               <a:rPr lang="en-US" smtClean="0"/>
-              <a:t>‹N°›</a:t>
+              <a:t>‹#›</a:t>
             </a:fld>
             <a:endParaRPr lang="en-US"/>
           </a:p>
@@ -2196,7 +2196,7 @@
           <a:p>
             <a:fld id="{5D07E66A-D2B8-49C1-B953-A60E29E54617}" type="datetime1">
               <a:rPr lang="en-US" smtClean="0"/>
-              <a:t>12/16/2013</a:t>
+              <a:t>17/12/2013</a:t>
             </a:fld>
             <a:endParaRPr lang="en-US"/>
           </a:p>
@@ -2242,7 +2242,7 @@
           <a:p>
             <a:fld id="{886BB73A-582F-4420-9A14-CB10A2B2E5E8}" type="slidenum">
               <a:rPr lang="en-US" smtClean="0"/>
-              <a:t>‹N°›</a:t>
+              <a:t>‹#›</a:t>
             </a:fld>
             <a:endParaRPr lang="en-US"/>
           </a:p>
@@ -2393,7 +2393,7 @@
           <a:p>
             <a:fld id="{49118059-27B3-498F-8140-2579206B8D99}" type="datetime1">
               <a:rPr lang="en-US" smtClean="0"/>
-              <a:t>12/16/2013</a:t>
+              <a:t>17/12/2013</a:t>
             </a:fld>
             <a:endParaRPr lang="en-US"/>
           </a:p>
@@ -2439,7 +2439,7 @@
           <a:p>
             <a:fld id="{886BB73A-582F-4420-9A14-CB10A2B2E5E8}" type="slidenum">
               <a:rPr lang="en-US" smtClean="0"/>
-              <a:t>‹N°›</a:t>
+              <a:t>‹#›</a:t>
             </a:fld>
             <a:endParaRPr lang="en-US"/>
           </a:p>
@@ -2501,7 +2501,7 @@
           <a:p>
             <a:fld id="{495AAB71-EB13-4CC7-B74A-37B7843E29AD}" type="datetime1">
               <a:rPr lang="en-US" smtClean="0"/>
-              <a:t>12/16/2013</a:t>
+              <a:t>17/12/2013</a:t>
             </a:fld>
             <a:endParaRPr lang="en-US"/>
           </a:p>
@@ -2547,7 +2547,7 @@
           <a:p>
             <a:fld id="{886BB73A-582F-4420-9A14-CB10A2B2E5E8}" type="slidenum">
               <a:rPr lang="en-US" smtClean="0"/>
-              <a:t>‹N°›</a:t>
+              <a:t>‹#›</a:t>
             </a:fld>
             <a:endParaRPr lang="en-US"/>
           </a:p>
@@ -2674,7 +2674,7 @@
           <a:p>
             <a:fld id="{56DDDAB1-01C0-4E58-8631-78ED1D427A3A}" type="datetime1">
               <a:rPr lang="en-US" smtClean="0"/>
-              <a:t>12/16/2013</a:t>
+              <a:t>17/12/2013</a:t>
             </a:fld>
             <a:endParaRPr lang="en-US"/>
           </a:p>
@@ -2720,7 +2720,7 @@
           <a:p>
             <a:fld id="{886BB73A-582F-4420-9A14-CB10A2B2E5E8}" type="slidenum">
               <a:rPr lang="en-US" smtClean="0"/>
-              <a:t>‹N°›</a:t>
+              <a:t>‹#›</a:t>
             </a:fld>
             <a:endParaRPr lang="en-US"/>
           </a:p>
@@ -2943,7 +2943,7 @@
             <a:pPr eaLnBrk="1" latinLnBrk="0" hangingPunct="1"/>
             <a:fld id="{E53AAB49-BFD3-4F12-BD10-7962ECE1A1D8}" type="datetime1">
               <a:rPr lang="en-US" smtClean="0"/>
-              <a:t>12/16/2013</a:t>
+              <a:t>17/12/2013</a:t>
             </a:fld>
             <a:endParaRPr lang="en-US"/>
           </a:p>
@@ -3004,7 +3004,7 @@
             <a:fld id="{2C6B1FF6-39B9-40F5-8B67-33C6354A3D4F}" type="slidenum">
               <a:rPr kumimoji="0" lang="en-US" smtClean="0"/>
               <a:pPr eaLnBrk="1" latinLnBrk="0" hangingPunct="1"/>
-              <a:t>‹N°›</a:t>
+              <a:t>‹#›</a:t>
             </a:fld>
             <a:endParaRPr kumimoji="0" lang="en-US" dirty="0">
               <a:solidFill>
@@ -3289,7 +3289,7 @@
           <a:p>
             <a:fld id="{FDEC4510-1BAC-4F24-BDE2-91A02A60B456}" type="datetime1">
               <a:rPr lang="en-US" smtClean="0"/>
-              <a:t>12/16/2013</a:t>
+              <a:t>17/12/2013</a:t>
             </a:fld>
             <a:endParaRPr lang="en-US"/>
           </a:p>
@@ -3335,7 +3335,7 @@
           <a:p>
             <a:fld id="{886BB73A-582F-4420-9A14-CB10A2B2E5E8}" type="slidenum">
               <a:rPr lang="en-US" smtClean="0"/>
-              <a:t>‹N°›</a:t>
+              <a:t>‹#›</a:t>
             </a:fld>
             <a:endParaRPr lang="en-US"/>
           </a:p>
@@ -3734,7 +3734,7 @@
           <a:p>
             <a:fld id="{032462A4-1693-4D59-9D5E-9D89B5989000}" type="datetime1">
               <a:rPr lang="en-US" smtClean="0"/>
-              <a:t>12/16/2013</a:t>
+              <a:t>17/12/2013</a:t>
             </a:fld>
             <a:endParaRPr lang="en-US"/>
           </a:p>
@@ -3780,7 +3780,7 @@
           <a:p>
             <a:fld id="{886BB73A-582F-4420-9A14-CB10A2B2E5E8}" type="slidenum">
               <a:rPr lang="en-US" smtClean="0"/>
-              <a:t>‹N°›</a:t>
+              <a:t>‹#›</a:t>
             </a:fld>
             <a:endParaRPr lang="en-US"/>
           </a:p>
@@ -3936,7 +3936,7 @@
           <a:p>
             <a:fld id="{B70ACB4D-32FE-4358-A04E-417D554E1309}" type="datetime1">
               <a:rPr lang="en-US" smtClean="0"/>
-              <a:t>12/16/2013</a:t>
+              <a:t>17/12/2013</a:t>
             </a:fld>
             <a:endParaRPr lang="en-US"/>
           </a:p>
@@ -3982,7 +3982,7 @@
           <a:p>
             <a:fld id="{886BB73A-582F-4420-9A14-CB10A2B2E5E8}" type="slidenum">
               <a:rPr lang="en-US" smtClean="0"/>
-              <a:t>‹N°›</a:t>
+              <a:t>‹#›</a:t>
             </a:fld>
             <a:endParaRPr lang="en-US"/>
           </a:p>
@@ -4223,7 +4223,7 @@
           <a:p>
             <a:fld id="{20B8108D-308F-4812-B17B-BFC5677CF8EB}" type="datetime1">
               <a:rPr lang="en-US" smtClean="0"/>
-              <a:t>12/16/2013</a:t>
+              <a:t>17/12/2013</a:t>
             </a:fld>
             <a:endParaRPr lang="en-US"/>
           </a:p>
@@ -4269,7 +4269,7 @@
           <a:p>
             <a:fld id="{886BB73A-582F-4420-9A14-CB10A2B2E5E8}" type="slidenum">
               <a:rPr lang="en-US" smtClean="0"/>
-              <a:t>‹N°›</a:t>
+              <a:t>‹#›</a:t>
             </a:fld>
             <a:endParaRPr lang="en-US"/>
           </a:p>
@@ -4595,7 +4595,7 @@
           <a:p>
             <a:fld id="{311E8696-9CA1-4A92-9AD2-9FBEEE051D4A}" type="datetime1">
               <a:rPr lang="en-US" smtClean="0"/>
-              <a:t>12/16/2013</a:t>
+              <a:t>17/12/2013</a:t>
             </a:fld>
             <a:endParaRPr lang="en-US"/>
           </a:p>
@@ -4641,7 +4641,7 @@
           <a:p>
             <a:fld id="{886BB73A-582F-4420-9A14-CB10A2B2E5E8}" type="slidenum">
               <a:rPr lang="en-US" smtClean="0"/>
-              <a:t>‹N°›</a:t>
+              <a:t>‹#›</a:t>
             </a:fld>
             <a:endParaRPr lang="en-US"/>
           </a:p>
@@ -5095,7 +5095,7 @@
           <a:p>
             <a:fld id="{FACE8EBF-4B78-47A5-9C4D-C65549CADC98}" type="datetime1">
               <a:rPr lang="en-US" smtClean="0"/>
-              <a:t>12/16/2013</a:t>
+              <a:t>17/12/2013</a:t>
             </a:fld>
             <a:endParaRPr lang="en-US"/>
           </a:p>
@@ -5141,7 +5141,7 @@
           <a:p>
             <a:fld id="{886BB73A-582F-4420-9A14-CB10A2B2E5E8}" type="slidenum">
               <a:rPr lang="en-US" smtClean="0"/>
-              <a:t>‹N°›</a:t>
+              <a:t>‹#›</a:t>
             </a:fld>
             <a:endParaRPr lang="en-US"/>
           </a:p>
@@ -5308,7 +5308,7 @@
           <a:p>
             <a:fld id="{7B44FFAE-43F3-46B8-9C5E-4838052BC682}" type="datetime1">
               <a:rPr lang="en-US" smtClean="0"/>
-              <a:t>12/16/2013</a:t>
+              <a:t>17/12/2013</a:t>
             </a:fld>
             <a:endParaRPr lang="en-US"/>
           </a:p>
@@ -5392,7 +5392,7 @@
           <a:p>
             <a:fld id="{886BB73A-582F-4420-9A14-CB10A2B2E5E8}" type="slidenum">
               <a:rPr lang="en-US" smtClean="0"/>
-              <a:t>‹N°›</a:t>
+              <a:t>‹#›</a:t>
             </a:fld>
             <a:endParaRPr lang="en-US"/>
           </a:p>
@@ -5858,14 +5858,14 @@
             <a:noFill/>
           </a:ln>
           <a:extLst>
-            <a:ext uri="{909E8E84-426E-40DD-AFC4-6F175D3DCCD1}">
+            <a:ext uri="{909E8E84-426E-40dd-AFC4-6F175D3DCCD1}">
               <a14:hiddenFill xmlns:a14="http://schemas.microsoft.com/office/drawing/2010/main">
                 <a:solidFill>
                   <a:schemeClr val="accent1"/>
                 </a:solidFill>
               </a14:hiddenFill>
             </a:ext>
-            <a:ext uri="{91240B29-F687-4F45-9708-019B960494DF}">
+            <a:ext uri="{91240B29-F687-4f45-9708-019B960494DF}">
               <a14:hiddenLine xmlns:a14="http://schemas.microsoft.com/office/drawing/2010/main" w="9525">
                 <a:solidFill>
                   <a:schemeClr val="tx1"/>
@@ -5891,7 +5891,7 @@
   <p:timing>
     <p:tnLst>
       <p:par>
-        <p:cTn id="1" dur="indefinite" restart="never" nodeType="tmRoot"/>
+        <p:cTn xmlns:p14="http://schemas.microsoft.com/office/powerpoint/2010/main" id="1" dur="indefinite" restart="never" nodeType="tmRoot"/>
       </p:par>
     </p:tnLst>
   </p:timing>
@@ -6095,7 +6095,7 @@
   <p:timing>
     <p:tnLst>
       <p:par>
-        <p:cTn id="1" dur="indefinite" restart="never" nodeType="tmRoot"/>
+        <p:cTn xmlns:p14="http://schemas.microsoft.com/office/powerpoint/2010/main" id="1" dur="indefinite" restart="never" nodeType="tmRoot"/>
       </p:par>
     </p:tnLst>
   </p:timing>
@@ -6208,7 +6208,6 @@
               <a:rPr lang="fr-FR" sz="2800" dirty="0" smtClean="0"/>
               <a:t>Bilan</a:t>
             </a:r>
-            <a:endParaRPr lang="fr-FR" sz="2800" dirty="0" smtClean="0"/>
           </a:p>
         </p:txBody>
       </p:sp>
@@ -6294,7 +6293,7 @@
   <p:timing>
     <p:tnLst>
       <p:par>
-        <p:cTn id="1" dur="indefinite" restart="never" nodeType="tmRoot"/>
+        <p:cTn xmlns:p14="http://schemas.microsoft.com/office/powerpoint/2010/main" id="1" dur="indefinite" restart="never" nodeType="tmRoot"/>
       </p:par>
     </p:tnLst>
   </p:timing>
@@ -6364,13 +6363,8 @@
             </a:pPr>
             <a:r>
               <a:rPr lang="fr-FR" sz="2800" dirty="0" smtClean="0"/>
-              <a:t>Automatiser la création des emplois du temps de </a:t>
-            </a:r>
-            <a:r>
-              <a:rPr lang="fr-FR" sz="2800" dirty="0" smtClean="0"/>
-              <a:t>l’école</a:t>
-            </a:r>
-            <a:endParaRPr lang="fr-FR" sz="2800" dirty="0" smtClean="0"/>
+              <a:t>Automatiser la création des emplois du temps de l’école</a:t>
+            </a:r>
           </a:p>
           <a:p>
             <a:pPr>
@@ -6379,11 +6373,7 @@
             </a:pPr>
             <a:r>
               <a:rPr lang="fr-FR" sz="2800" dirty="0" smtClean="0"/>
-              <a:t>Problème d’ordonnancement </a:t>
-            </a:r>
-            <a:r>
-              <a:rPr lang="fr-FR" sz="2800" dirty="0" smtClean="0"/>
-              <a:t>complexe</a:t>
+              <a:t>Problème d’ordonnancement complexe</a:t>
             </a:r>
             <a:endParaRPr lang="fr-FR" sz="2800" dirty="0"/>
           </a:p>
@@ -6394,11 +6384,7 @@
             </a:pPr>
             <a:r>
               <a:rPr lang="fr-FR" sz="2800" dirty="0" smtClean="0"/>
-              <a:t>Pas de solution optimale </a:t>
-            </a:r>
-            <a:r>
-              <a:rPr lang="fr-FR" sz="2800" dirty="0" smtClean="0"/>
-              <a:t>!</a:t>
+              <a:t>Pas de solution optimale !</a:t>
             </a:r>
           </a:p>
           <a:p>
@@ -6410,7 +6396,6 @@
               <a:rPr lang="fr-FR" sz="2800" dirty="0" smtClean="0"/>
               <a:t>Comparaison l’existant</a:t>
             </a:r>
-            <a:endParaRPr lang="fr-FR" sz="2800" dirty="0" smtClean="0"/>
           </a:p>
         </p:txBody>
       </p:sp>
@@ -6496,7 +6481,7 @@
   <p:timing>
     <p:tnLst>
       <p:par>
-        <p:cTn id="1" dur="indefinite" restart="never" nodeType="tmRoot"/>
+        <p:cTn xmlns:p14="http://schemas.microsoft.com/office/powerpoint/2010/main" id="1" dur="indefinite" restart="never" nodeType="tmRoot"/>
       </p:par>
     </p:tnLst>
   </p:timing>
@@ -6543,9 +6528,78 @@
           </a:p>
         </p:txBody>
       </p:sp>
+      <p:sp>
+        <p:nvSpPr>
+          <p:cNvPr id="8" name="Espace réservé du pied de page 3"/>
+          <p:cNvSpPr>
+            <a:spLocks noGrp="1"/>
+          </p:cNvSpPr>
+          <p:nvPr>
+            <p:ph type="ftr" sz="quarter" idx="11"/>
+          </p:nvPr>
+        </p:nvSpPr>
+        <p:spPr>
+          <a:xfrm>
+            <a:off x="2603733" y="6270171"/>
+            <a:ext cx="4188958" cy="508454"/>
+          </a:xfrm>
+        </p:spPr>
+        <p:txBody>
+          <a:bodyPr/>
+          <a:lstStyle/>
+          <a:p>
+            <a:pPr algn="ctr"/>
+            <a:r>
+              <a:rPr lang="en-US" sz="1600" b="0" dirty="0" smtClean="0">
+                <a:solidFill>
+                  <a:schemeClr val="bg1">
+                    <a:lumMod val="75000"/>
+                  </a:schemeClr>
+                </a:solidFill>
+              </a:rPr>
+              <a:t>COUDRAY</a:t>
+            </a:r>
+            <a:r>
+              <a:rPr lang="en-US" sz="1600" dirty="0" smtClean="0">
+                <a:solidFill>
+                  <a:schemeClr val="bg1">
+                    <a:lumMod val="75000"/>
+                  </a:schemeClr>
+                </a:solidFill>
+              </a:rPr>
+              <a:t> - </a:t>
+            </a:r>
+            <a:r>
+              <a:rPr lang="en-US" sz="1600" b="0" dirty="0" smtClean="0">
+                <a:solidFill>
+                  <a:schemeClr val="bg1">
+                    <a:lumMod val="75000"/>
+                  </a:schemeClr>
+                </a:solidFill>
+              </a:rPr>
+              <a:t>JULIEN</a:t>
+            </a:r>
+            <a:r>
+              <a:rPr lang="en-US" sz="1600" dirty="0" smtClean="0">
+                <a:solidFill>
+                  <a:schemeClr val="bg1">
+                    <a:lumMod val="75000"/>
+                  </a:schemeClr>
+                </a:solidFill>
+              </a:rPr>
+              <a:t> - </a:t>
+            </a:r>
+            <a:r>
+              <a:rPr lang="en-US" sz="1600" dirty="0" smtClean="0"/>
+              <a:t>TRAN</a:t>
+            </a:r>
+            <a:endParaRPr lang="en-US" sz="1600" dirty="0"/>
+          </a:p>
+        </p:txBody>
+      </p:sp>
       <p:pic>
         <p:nvPicPr>
-          <p:cNvPr id="7" name="Image 6" descr="DiagrammeClasse2.png"/>
+          <p:cNvPr id="4" name="Image 3" descr="DiagrammeClassePPT (1).png"/>
           <p:cNvPicPr>
             <a:picLocks noChangeAspect="1"/>
           </p:cNvPicPr>
@@ -6565,86 +6619,14 @@
         </p:blipFill>
         <p:spPr>
           <a:xfrm>
-            <a:off x="962189" y="179588"/>
-            <a:ext cx="6924551" cy="6196080"/>
+            <a:off x="-38487" y="2168196"/>
+            <a:ext cx="9144000" cy="4354286"/>
           </a:xfrm>
           <a:prstGeom prst="rect">
             <a:avLst/>
           </a:prstGeom>
-          <a:ln w="12700" cmpd="sng">
-            <a:noFill/>
-          </a:ln>
         </p:spPr>
       </p:pic>
-      <p:sp>
-        <p:nvSpPr>
-          <p:cNvPr id="8" name="Espace réservé du pied de page 3"/>
-          <p:cNvSpPr>
-            <a:spLocks noGrp="1"/>
-          </p:cNvSpPr>
-          <p:nvPr>
-            <p:ph type="ftr" sz="quarter" idx="11"/>
-          </p:nvPr>
-        </p:nvSpPr>
-        <p:spPr>
-          <a:xfrm>
-            <a:off x="2603733" y="6270171"/>
-            <a:ext cx="4188958" cy="508454"/>
-          </a:xfrm>
-        </p:spPr>
-        <p:txBody>
-          <a:bodyPr/>
-          <a:lstStyle/>
-          <a:p>
-            <a:pPr algn="ctr"/>
-            <a:r>
-              <a:rPr lang="en-US" sz="1600" b="0" dirty="0" smtClean="0">
-                <a:solidFill>
-                  <a:schemeClr val="bg1">
-                    <a:lumMod val="75000"/>
-                  </a:schemeClr>
-                </a:solidFill>
-              </a:rPr>
-              <a:t>COUDRAY</a:t>
-            </a:r>
-            <a:r>
-              <a:rPr lang="en-US" sz="1600" dirty="0" smtClean="0">
-                <a:solidFill>
-                  <a:schemeClr val="bg1">
-                    <a:lumMod val="75000"/>
-                  </a:schemeClr>
-                </a:solidFill>
-              </a:rPr>
-              <a:t> - </a:t>
-            </a:r>
-            <a:r>
-              <a:rPr lang="en-US" sz="1600" b="0" dirty="0" smtClean="0">
-                <a:solidFill>
-                  <a:schemeClr val="bg1">
-                    <a:lumMod val="75000"/>
-                  </a:schemeClr>
-                </a:solidFill>
-              </a:rPr>
-              <a:t>JULIEN</a:t>
-            </a:r>
-            <a:r>
-              <a:rPr lang="en-US" sz="1600" dirty="0" smtClean="0">
-                <a:solidFill>
-                  <a:schemeClr val="bg1">
-                    <a:lumMod val="75000"/>
-                  </a:schemeClr>
-                </a:solidFill>
-              </a:rPr>
-              <a:t> - </a:t>
-            </a:r>
-            <a:r>
-              <a:rPr lang="en-US" sz="1600" dirty="0" smtClean="0"/>
-              <a:t>TRAN</a:t>
-            </a:r>
-            <a:endParaRPr lang="en-US" sz="1600" dirty="0"/>
-          </a:p>
-        </p:txBody>
-      </p:sp>
     </p:spTree>
     <p:extLst>
       <p:ext uri="{BB962C8B-B14F-4D97-AF65-F5344CB8AC3E}">
@@ -6658,121 +6640,7 @@
   <p:timing>
     <p:tnLst>
       <p:par>
-        <p:cTn id="1" dur="indefinite" restart="never" nodeType="tmRoot">
-          <p:childTnLst>
-            <p:seq concurrent="1" nextAc="seek">
-              <p:cTn id="2" dur="indefinite" nodeType="mainSeq">
-                <p:childTnLst>
-                  <p:par>
-                    <p:cTn id="3" fill="hold">
-                      <p:stCondLst>
-                        <p:cond delay="indefinite"/>
-                      </p:stCondLst>
-                      <p:childTnLst>
-                        <p:par>
-                          <p:cTn id="4" fill="hold">
-                            <p:stCondLst>
-                              <p:cond delay="0"/>
-                            </p:stCondLst>
-                            <p:childTnLst>
-                              <p:par>
-                                <p:cTn id="5" presetID="23" presetClass="entr" presetSubtype="16" fill="hold" nodeType="clickEffect">
-                                  <p:stCondLst>
-                                    <p:cond delay="0"/>
-                                  </p:stCondLst>
-                                  <p:childTnLst>
-                                    <p:set>
-                                      <p:cBhvr>
-                                        <p:cTn id="6" dur="1" fill="hold">
-                                          <p:stCondLst>
-                                            <p:cond delay="0"/>
-                                          </p:stCondLst>
-                                        </p:cTn>
-                                        <p:tgtEl>
-                                          <p:spTgt spid="7"/>
-                                        </p:tgtEl>
-                                        <p:attrNameLst>
-                                          <p:attrName>style.visibility</p:attrName>
-                                        </p:attrNameLst>
-                                      </p:cBhvr>
-                                      <p:to>
-                                        <p:strVal val="visible"/>
-                                      </p:to>
-                                    </p:set>
-                                    <p:anim calcmode="lin" valueType="num">
-                                      <p:cBhvr>
-                                        <p:cTn id="7" dur="500" fill="hold"/>
-                                        <p:tgtEl>
-                                          <p:spTgt spid="7"/>
-                                        </p:tgtEl>
-                                        <p:attrNameLst>
-                                          <p:attrName>ppt_w</p:attrName>
-                                        </p:attrNameLst>
-                                      </p:cBhvr>
-                                      <p:tavLst>
-                                        <p:tav tm="0">
-                                          <p:val>
-                                            <p:fltVal val="0"/>
-                                          </p:val>
-                                        </p:tav>
-                                        <p:tav tm="100000">
-                                          <p:val>
-                                            <p:strVal val="#ppt_w"/>
-                                          </p:val>
-                                        </p:tav>
-                                      </p:tavLst>
-                                    </p:anim>
-                                    <p:anim calcmode="lin" valueType="num">
-                                      <p:cBhvr>
-                                        <p:cTn id="8" dur="500" fill="hold"/>
-                                        <p:tgtEl>
-                                          <p:spTgt spid="7"/>
-                                        </p:tgtEl>
-                                        <p:attrNameLst>
-                                          <p:attrName>ppt_h</p:attrName>
-                                        </p:attrNameLst>
-                                      </p:cBhvr>
-                                      <p:tavLst>
-                                        <p:tav tm="0">
-                                          <p:val>
-                                            <p:fltVal val="0"/>
-                                          </p:val>
-                                        </p:tav>
-                                        <p:tav tm="100000">
-                                          <p:val>
-                                            <p:strVal val="#ppt_h"/>
-                                          </p:val>
-                                        </p:tav>
-                                      </p:tavLst>
-                                    </p:anim>
-                                  </p:childTnLst>
-                                </p:cTn>
-                              </p:par>
-                            </p:childTnLst>
-                          </p:cTn>
-                        </p:par>
-                      </p:childTnLst>
-                    </p:cTn>
-                  </p:par>
-                </p:childTnLst>
-              </p:cTn>
-              <p:prevCondLst>
-                <p:cond evt="onPrev" delay="0">
-                  <p:tgtEl>
-                    <p:sldTgt/>
-                  </p:tgtEl>
-                </p:cond>
-              </p:prevCondLst>
-              <p:nextCondLst>
-                <p:cond evt="onNext" delay="0">
-                  <p:tgtEl>
-                    <p:sldTgt/>
-                  </p:tgtEl>
-                </p:cond>
-              </p:nextCondLst>
-            </p:seq>
-          </p:childTnLst>
-        </p:cTn>
+        <p:cTn xmlns:p14="http://schemas.microsoft.com/office/powerpoint/2010/main" id="1" dur="indefinite" restart="never" nodeType="tmRoot"/>
       </p:par>
     </p:tnLst>
   </p:timing>
@@ -6986,7 +6854,7 @@
   <p:timing>
     <p:tnLst>
       <p:par>
-        <p:cTn id="1" dur="indefinite" restart="never" nodeType="tmRoot"/>
+        <p:cTn xmlns:p14="http://schemas.microsoft.com/office/powerpoint/2010/main" id="1" dur="indefinite" restart="never" nodeType="tmRoot"/>
       </p:par>
     </p:tnLst>
   </p:timing>
@@ -7218,7 +7086,7 @@
   <p:timing>
     <p:tnLst>
       <p:par>
-        <p:cTn id="1" dur="indefinite" restart="never" nodeType="tmRoot"/>
+        <p:cTn xmlns:p14="http://schemas.microsoft.com/office/powerpoint/2010/main" id="1" dur="indefinite" restart="never" nodeType="tmRoot"/>
       </p:par>
     </p:tnLst>
   </p:timing>
@@ -8703,7 +8571,7 @@
   <p:timing>
     <p:tnLst>
       <p:par>
-        <p:cTn id="1" dur="indefinite" restart="never" nodeType="tmRoot">
+        <p:cTn xmlns:p14="http://schemas.microsoft.com/office/powerpoint/2010/main" id="1" dur="indefinite" restart="never" nodeType="tmRoot">
           <p:childTnLst>
             <p:seq concurrent="1" nextAc="seek">
               <p:cTn id="2" dur="indefinite" nodeType="mainSeq">
@@ -9430,7 +9298,7 @@
   <p:timing>
     <p:tnLst>
       <p:par>
-        <p:cTn id="1" dur="indefinite" restart="never" nodeType="tmRoot">
+        <p:cTn xmlns:p14="http://schemas.microsoft.com/office/powerpoint/2010/main" id="1" dur="indefinite" restart="never" nodeType="tmRoot">
           <p:childTnLst>
             <p:seq concurrent="1" nextAc="seek">
               <p:cTn id="2" dur="indefinite" nodeType="mainSeq">
@@ -11967,7 +11835,7 @@
   <p:timing>
     <p:tnLst>
       <p:par>
-        <p:cTn id="1" dur="indefinite" restart="never" nodeType="tmRoot">
+        <p:cTn xmlns:p14="http://schemas.microsoft.com/office/powerpoint/2010/main" id="1" dur="indefinite" restart="never" nodeType="tmRoot">
           <p:childTnLst>
             <p:seq concurrent="1" nextAc="seek">
               <p:cTn id="2" dur="indefinite" nodeType="mainSeq">

</xml_diff>

<commit_message>
modif apres rdv mohia
</commit_message>
<xml_diff>
--- a/Soutenance_miProjet.pptx
+++ b/Soutenance_miProjet.pptx
@@ -13,7 +13,7 @@
     <p:sldId id="258" r:id="rId4"/>
     <p:sldId id="259" r:id="rId5"/>
     <p:sldId id="262" r:id="rId6"/>
-    <p:sldId id="260" r:id="rId7"/>
+    <p:sldId id="266" r:id="rId7"/>
     <p:sldId id="263" r:id="rId8"/>
     <p:sldId id="264" r:id="rId9"/>
     <p:sldId id="265" r:id="rId10"/>
@@ -359,7 +359,7 @@
           <a:p>
             <a:fld id="{B956A79E-FAC0-1942-8597-B8D8938A06DC}" type="slidenum">
               <a:rPr lang="fr-FR" smtClean="0"/>
-              <a:t>‹#›</a:t>
+              <a:t>‹N°›</a:t>
             </a:fld>
             <a:endParaRPr lang="fr-FR"/>
           </a:p>
@@ -770,72 +770,6 @@
           <a:bodyPr/>
           <a:lstStyle/>
           <a:p>
-            <a:pPr marL="342900" lvl="1" indent="-342900">
-              <a:spcBef>
-                <a:spcPts val="2000"/>
-              </a:spcBef>
-              <a:buClr>
-                <a:schemeClr val="accent1"/>
-              </a:buClr>
-              <a:buFont typeface="Wingdings" charset="2"/>
-              <a:buChar char="§"/>
-            </a:pPr>
-            <a:r>
-              <a:rPr lang="fr-FR" sz="2400" dirty="0" smtClean="0"/>
-              <a:t>Une promotion d’une classe sans les salles</a:t>
-            </a:r>
-          </a:p>
-          <a:p>
-            <a:pPr lvl="1">
-              <a:buFont typeface="Wingdings" charset="2"/>
-              <a:buChar char="§"/>
-            </a:pPr>
-            <a:r>
-              <a:rPr lang="fr-FR" sz="2400" dirty="0" smtClean="0"/>
-              <a:t>Répartition des cours sur les créneaux</a:t>
-            </a:r>
-          </a:p>
-          <a:p>
-            <a:pPr lvl="1">
-              <a:buFont typeface="Wingdings" charset="2"/>
-              <a:buChar char="§"/>
-            </a:pPr>
-            <a:r>
-              <a:rPr lang="fr-FR" sz="2400" dirty="0" smtClean="0"/>
-              <a:t>Gestion de conflits</a:t>
-            </a:r>
-          </a:p>
-          <a:p>
-            <a:pPr lvl="1">
-              <a:buFont typeface="Wingdings" charset="2"/>
-              <a:buChar char="§"/>
-            </a:pPr>
-            <a:r>
-              <a:rPr lang="fr-FR" sz="2400" dirty="0" smtClean="0"/>
-              <a:t>Prise en compte des disponibilités des professeurs</a:t>
-            </a:r>
-          </a:p>
-          <a:p>
-            <a:pPr lvl="1">
-              <a:buFont typeface="Wingdings" charset="2"/>
-              <a:buChar char="§"/>
-            </a:pPr>
-            <a:r>
-              <a:rPr lang="fr-FR" sz="2400" dirty="0" smtClean="0"/>
-              <a:t>Ordre de priorité des professeurs</a:t>
-            </a:r>
-          </a:p>
-          <a:p>
-            <a:pPr lvl="1">
-              <a:buFont typeface="Wingdings" charset="2"/>
-              <a:buChar char="§"/>
-            </a:pPr>
-            <a:r>
-              <a:rPr lang="fr-FR" sz="2400" dirty="0" smtClean="0"/>
-              <a:t>Cours sur le même créneau sur des semaines consécutives</a:t>
-            </a:r>
-          </a:p>
-          <a:p>
             <a:endParaRPr lang="fr-FR" dirty="0"/>
           </a:p>
         </p:txBody>
@@ -1073,7 +1007,7 @@
             <a:pPr eaLnBrk="1" latinLnBrk="0" hangingPunct="1"/>
             <a:fld id="{7E67FBA8-66D5-45E8-A9CB-6E4000F8E69E}" type="datetime1">
               <a:rPr lang="en-US" smtClean="0"/>
-              <a:t>17/12/2013</a:t>
+              <a:t>12/17/2013</a:t>
             </a:fld>
             <a:endParaRPr lang="en-US"/>
           </a:p>
@@ -1119,7 +1053,7 @@
           <a:p>
             <a:fld id="{7F5CE407-6216-4202-80E4-A30DC2F709B2}" type="slidenum">
               <a:rPr lang="en-US" smtClean="0"/>
-              <a:t>‹#›</a:t>
+              <a:t>‹N°›</a:t>
             </a:fld>
             <a:endParaRPr lang="en-US"/>
           </a:p>
@@ -1206,7 +1140,7 @@
           <a:p>
             <a:fld id="{3FFF98ED-0755-4755-8632-F7C31FD349F7}" type="datetime1">
               <a:rPr lang="en-US" smtClean="0"/>
-              <a:t>17/12/2013</a:t>
+              <a:t>12/17/2013</a:t>
             </a:fld>
             <a:endParaRPr lang="en-US"/>
           </a:p>
@@ -1252,7 +1186,7 @@
           <a:p>
             <a:fld id="{886BB73A-582F-4420-9A14-CB10A2B2E5E8}" type="slidenum">
               <a:rPr lang="en-US" smtClean="0"/>
-              <a:t>‹#›</a:t>
+              <a:t>‹N°›</a:t>
             </a:fld>
             <a:endParaRPr lang="en-US"/>
           </a:p>
@@ -1515,7 +1449,7 @@
           <a:p>
             <a:fld id="{5A1A947A-C5EE-4C17-A02D-6B0D5BC94F10}" type="datetime1">
               <a:rPr lang="en-US" smtClean="0"/>
-              <a:t>17/12/2013</a:t>
+              <a:t>12/17/2013</a:t>
             </a:fld>
             <a:endParaRPr lang="en-US"/>
           </a:p>
@@ -1561,7 +1495,7 @@
           <a:p>
             <a:fld id="{7F5CE407-6216-4202-80E4-A30DC2F709B2}" type="slidenum">
               <a:rPr lang="en-US" smtClean="0"/>
-              <a:t>‹#›</a:t>
+              <a:t>‹N°›</a:t>
             </a:fld>
             <a:endParaRPr lang="en-US"/>
           </a:p>
@@ -1744,7 +1678,7 @@
           <a:p>
             <a:fld id="{A0CE5133-35BD-4B9D-A767-7CFF8D1AB082}" type="datetime1">
               <a:rPr lang="en-US" smtClean="0"/>
-              <a:t>17/12/2013</a:t>
+              <a:t>12/17/2013</a:t>
             </a:fld>
             <a:endParaRPr lang="en-US"/>
           </a:p>
@@ -1790,7 +1724,7 @@
           <a:p>
             <a:fld id="{886BB73A-582F-4420-9A14-CB10A2B2E5E8}" type="slidenum">
               <a:rPr lang="en-US" smtClean="0"/>
-              <a:t>‹#›</a:t>
+              <a:t>‹N°›</a:t>
             </a:fld>
             <a:endParaRPr lang="en-US"/>
           </a:p>
@@ -2018,7 +1952,7 @@
           <a:p>
             <a:fld id="{DD548307-BFB2-4F00-9A09-ABF429E2346C}" type="datetime1">
               <a:rPr lang="en-US" smtClean="0"/>
-              <a:t>17/12/2013</a:t>
+              <a:t>12/17/2013</a:t>
             </a:fld>
             <a:endParaRPr lang="en-US"/>
           </a:p>
@@ -2064,7 +1998,7 @@
           <a:p>
             <a:fld id="{886BB73A-582F-4420-9A14-CB10A2B2E5E8}" type="slidenum">
               <a:rPr lang="en-US" smtClean="0"/>
-              <a:t>‹#›</a:t>
+              <a:t>‹N°›</a:t>
             </a:fld>
             <a:endParaRPr lang="en-US"/>
           </a:p>
@@ -2347,7 +2281,7 @@
           <a:p>
             <a:fld id="{5D07E66A-D2B8-49C1-B953-A60E29E54617}" type="datetime1">
               <a:rPr lang="en-US" smtClean="0"/>
-              <a:t>17/12/2013</a:t>
+              <a:t>12/17/2013</a:t>
             </a:fld>
             <a:endParaRPr lang="en-US"/>
           </a:p>
@@ -2393,7 +2327,7 @@
           <a:p>
             <a:fld id="{886BB73A-582F-4420-9A14-CB10A2B2E5E8}" type="slidenum">
               <a:rPr lang="en-US" smtClean="0"/>
-              <a:t>‹#›</a:t>
+              <a:t>‹N°›</a:t>
             </a:fld>
             <a:endParaRPr lang="en-US"/>
           </a:p>
@@ -2544,7 +2478,7 @@
           <a:p>
             <a:fld id="{49118059-27B3-498F-8140-2579206B8D99}" type="datetime1">
               <a:rPr lang="en-US" smtClean="0"/>
-              <a:t>17/12/2013</a:t>
+              <a:t>12/17/2013</a:t>
             </a:fld>
             <a:endParaRPr lang="en-US"/>
           </a:p>
@@ -2590,7 +2524,7 @@
           <a:p>
             <a:fld id="{886BB73A-582F-4420-9A14-CB10A2B2E5E8}" type="slidenum">
               <a:rPr lang="en-US" smtClean="0"/>
-              <a:t>‹#›</a:t>
+              <a:t>‹N°›</a:t>
             </a:fld>
             <a:endParaRPr lang="en-US"/>
           </a:p>
@@ -2652,7 +2586,7 @@
           <a:p>
             <a:fld id="{495AAB71-EB13-4CC7-B74A-37B7843E29AD}" type="datetime1">
               <a:rPr lang="en-US" smtClean="0"/>
-              <a:t>17/12/2013</a:t>
+              <a:t>12/17/2013</a:t>
             </a:fld>
             <a:endParaRPr lang="en-US"/>
           </a:p>
@@ -2698,7 +2632,7 @@
           <a:p>
             <a:fld id="{886BB73A-582F-4420-9A14-CB10A2B2E5E8}" type="slidenum">
               <a:rPr lang="en-US" smtClean="0"/>
-              <a:t>‹#›</a:t>
+              <a:t>‹N°›</a:t>
             </a:fld>
             <a:endParaRPr lang="en-US"/>
           </a:p>
@@ -2825,7 +2759,7 @@
           <a:p>
             <a:fld id="{56DDDAB1-01C0-4E58-8631-78ED1D427A3A}" type="datetime1">
               <a:rPr lang="en-US" smtClean="0"/>
-              <a:t>17/12/2013</a:t>
+              <a:t>12/17/2013</a:t>
             </a:fld>
             <a:endParaRPr lang="en-US"/>
           </a:p>
@@ -2871,7 +2805,7 @@
           <a:p>
             <a:fld id="{886BB73A-582F-4420-9A14-CB10A2B2E5E8}" type="slidenum">
               <a:rPr lang="en-US" smtClean="0"/>
-              <a:t>‹#›</a:t>
+              <a:t>‹N°›</a:t>
             </a:fld>
             <a:endParaRPr lang="en-US"/>
           </a:p>
@@ -3094,7 +3028,7 @@
             <a:pPr eaLnBrk="1" latinLnBrk="0" hangingPunct="1"/>
             <a:fld id="{E53AAB49-BFD3-4F12-BD10-7962ECE1A1D8}" type="datetime1">
               <a:rPr lang="en-US" smtClean="0"/>
-              <a:t>17/12/2013</a:t>
+              <a:t>12/17/2013</a:t>
             </a:fld>
             <a:endParaRPr lang="en-US"/>
           </a:p>
@@ -3155,7 +3089,7 @@
             <a:fld id="{2C6B1FF6-39B9-40F5-8B67-33C6354A3D4F}" type="slidenum">
               <a:rPr kumimoji="0" lang="en-US" smtClean="0"/>
               <a:pPr eaLnBrk="1" latinLnBrk="0" hangingPunct="1"/>
-              <a:t>‹#›</a:t>
+              <a:t>‹N°›</a:t>
             </a:fld>
             <a:endParaRPr kumimoji="0" lang="en-US" dirty="0">
               <a:solidFill>
@@ -3440,7 +3374,7 @@
           <a:p>
             <a:fld id="{FDEC4510-1BAC-4F24-BDE2-91A02A60B456}" type="datetime1">
               <a:rPr lang="en-US" smtClean="0"/>
-              <a:t>17/12/2013</a:t>
+              <a:t>12/17/2013</a:t>
             </a:fld>
             <a:endParaRPr lang="en-US"/>
           </a:p>
@@ -3486,7 +3420,7 @@
           <a:p>
             <a:fld id="{886BB73A-582F-4420-9A14-CB10A2B2E5E8}" type="slidenum">
               <a:rPr lang="en-US" smtClean="0"/>
-              <a:t>‹#›</a:t>
+              <a:t>‹N°›</a:t>
             </a:fld>
             <a:endParaRPr lang="en-US"/>
           </a:p>
@@ -3885,7 +3819,7 @@
           <a:p>
             <a:fld id="{032462A4-1693-4D59-9D5E-9D89B5989000}" type="datetime1">
               <a:rPr lang="en-US" smtClean="0"/>
-              <a:t>17/12/2013</a:t>
+              <a:t>12/17/2013</a:t>
             </a:fld>
             <a:endParaRPr lang="en-US"/>
           </a:p>
@@ -3931,7 +3865,7 @@
           <a:p>
             <a:fld id="{886BB73A-582F-4420-9A14-CB10A2B2E5E8}" type="slidenum">
               <a:rPr lang="en-US" smtClean="0"/>
-              <a:t>‹#›</a:t>
+              <a:t>‹N°›</a:t>
             </a:fld>
             <a:endParaRPr lang="en-US"/>
           </a:p>
@@ -4087,7 +4021,7 @@
           <a:p>
             <a:fld id="{B70ACB4D-32FE-4358-A04E-417D554E1309}" type="datetime1">
               <a:rPr lang="en-US" smtClean="0"/>
-              <a:t>17/12/2013</a:t>
+              <a:t>12/17/2013</a:t>
             </a:fld>
             <a:endParaRPr lang="en-US"/>
           </a:p>
@@ -4133,7 +4067,7 @@
           <a:p>
             <a:fld id="{886BB73A-582F-4420-9A14-CB10A2B2E5E8}" type="slidenum">
               <a:rPr lang="en-US" smtClean="0"/>
-              <a:t>‹#›</a:t>
+              <a:t>‹N°›</a:t>
             </a:fld>
             <a:endParaRPr lang="en-US"/>
           </a:p>
@@ -4374,7 +4308,7 @@
           <a:p>
             <a:fld id="{20B8108D-308F-4812-B17B-BFC5677CF8EB}" type="datetime1">
               <a:rPr lang="en-US" smtClean="0"/>
-              <a:t>17/12/2013</a:t>
+              <a:t>12/17/2013</a:t>
             </a:fld>
             <a:endParaRPr lang="en-US"/>
           </a:p>
@@ -4420,7 +4354,7 @@
           <a:p>
             <a:fld id="{886BB73A-582F-4420-9A14-CB10A2B2E5E8}" type="slidenum">
               <a:rPr lang="en-US" smtClean="0"/>
-              <a:t>‹#›</a:t>
+              <a:t>‹N°›</a:t>
             </a:fld>
             <a:endParaRPr lang="en-US"/>
           </a:p>
@@ -4746,7 +4680,7 @@
           <a:p>
             <a:fld id="{311E8696-9CA1-4A92-9AD2-9FBEEE051D4A}" type="datetime1">
               <a:rPr lang="en-US" smtClean="0"/>
-              <a:t>17/12/2013</a:t>
+              <a:t>12/17/2013</a:t>
             </a:fld>
             <a:endParaRPr lang="en-US"/>
           </a:p>
@@ -4792,7 +4726,7 @@
           <a:p>
             <a:fld id="{886BB73A-582F-4420-9A14-CB10A2B2E5E8}" type="slidenum">
               <a:rPr lang="en-US" smtClean="0"/>
-              <a:t>‹#›</a:t>
+              <a:t>‹N°›</a:t>
             </a:fld>
             <a:endParaRPr lang="en-US"/>
           </a:p>
@@ -5246,7 +5180,7 @@
           <a:p>
             <a:fld id="{FACE8EBF-4B78-47A5-9C4D-C65549CADC98}" type="datetime1">
               <a:rPr lang="en-US" smtClean="0"/>
-              <a:t>17/12/2013</a:t>
+              <a:t>12/17/2013</a:t>
             </a:fld>
             <a:endParaRPr lang="en-US"/>
           </a:p>
@@ -5292,7 +5226,7 @@
           <a:p>
             <a:fld id="{886BB73A-582F-4420-9A14-CB10A2B2E5E8}" type="slidenum">
               <a:rPr lang="en-US" smtClean="0"/>
-              <a:t>‹#›</a:t>
+              <a:t>‹N°›</a:t>
             </a:fld>
             <a:endParaRPr lang="en-US"/>
           </a:p>
@@ -5459,7 +5393,7 @@
           <a:p>
             <a:fld id="{7B44FFAE-43F3-46B8-9C5E-4838052BC682}" type="datetime1">
               <a:rPr lang="en-US" smtClean="0"/>
-              <a:t>17/12/2013</a:t>
+              <a:t>12/17/2013</a:t>
             </a:fld>
             <a:endParaRPr lang="en-US"/>
           </a:p>
@@ -5543,7 +5477,7 @@
           <a:p>
             <a:fld id="{886BB73A-582F-4420-9A14-CB10A2B2E5E8}" type="slidenum">
               <a:rPr lang="en-US" smtClean="0"/>
-              <a:t>‹#›</a:t>
+              <a:t>‹N°›</a:t>
             </a:fld>
             <a:endParaRPr lang="en-US"/>
           </a:p>
@@ -5926,25 +5860,23 @@
             <p:ph type="ctrTitle"/>
           </p:nvPr>
         </p:nvSpPr>
-        <p:spPr/>
+        <p:spPr>
+          <a:xfrm>
+            <a:off x="457199" y="509668"/>
+            <a:ext cx="8357017" cy="2563058"/>
+          </a:xfrm>
+        </p:spPr>
         <p:txBody>
           <a:bodyPr>
-            <a:normAutofit fontScale="90000"/>
+            <a:normAutofit/>
           </a:bodyPr>
           <a:lstStyle/>
           <a:p>
             <a:r>
-              <a:rPr lang="fr-FR" dirty="0" smtClean="0"/>
-              <a:t>Résolution approchée du problème d’ordonnancement</a:t>
-            </a:r>
-            <a:br>
-              <a:rPr lang="fr-FR" dirty="0" smtClean="0"/>
-            </a:br>
-            <a:r>
-              <a:rPr lang="fr-FR" sz="2700" dirty="0" smtClean="0"/>
-              <a:t>Cas de l’emploi du temps de l’ESME SUDRIA</a:t>
-            </a:r>
-            <a:endParaRPr lang="fr-FR" sz="2700" dirty="0"/>
+              <a:rPr lang="fr-FR" sz="4800" dirty="0" smtClean="0"/>
+              <a:t>RÉSOLUTION APPROCHÉE DU PROBLÈME D’ORDONNANCEMENT</a:t>
+            </a:r>
+            <a:endParaRPr lang="fr-FR" sz="5400" dirty="0"/>
           </a:p>
         </p:txBody>
       </p:sp>
@@ -5960,7 +5892,7 @@
         </p:nvSpPr>
         <p:spPr>
           <a:xfrm>
-            <a:off x="457199" y="3692807"/>
+            <a:off x="457199" y="4487277"/>
             <a:ext cx="8228013" cy="1066800"/>
           </a:xfrm>
         </p:spPr>
@@ -6016,14 +5948,14 @@
             <a:noFill/>
           </a:ln>
           <a:extLst>
-            <a:ext uri="{909E8E84-426E-40dd-AFC4-6F175D3DCCD1}">
+            <a:ext uri="{909E8E84-426E-40DD-AFC4-6F175D3DCCD1}">
               <a14:hiddenFill xmlns:a14="http://schemas.microsoft.com/office/drawing/2010/main">
                 <a:solidFill>
                   <a:schemeClr val="accent1"/>
                 </a:solidFill>
               </a14:hiddenFill>
             </a:ext>
-            <a:ext uri="{91240B29-F687-4f45-9708-019B960494DF}">
+            <a:ext uri="{91240B29-F687-4F45-9708-019B960494DF}">
               <a14:hiddenLine xmlns:a14="http://schemas.microsoft.com/office/drawing/2010/main" w="9525">
                 <a:solidFill>
                   <a:schemeClr val="tx1"/>
@@ -6036,6 +5968,40 @@
           </a:extLst>
         </p:spPr>
       </p:pic>
+      <p:sp>
+        <p:nvSpPr>
+          <p:cNvPr id="4" name="ZoneTexte 3"/>
+          <p:cNvSpPr txBox="1"/>
+          <p:nvPr/>
+        </p:nvSpPr>
+        <p:spPr>
+          <a:xfrm>
+            <a:off x="149902" y="3428125"/>
+            <a:ext cx="8794754" cy="523220"/>
+          </a:xfrm>
+          <a:prstGeom prst="rect">
+            <a:avLst/>
+          </a:prstGeom>
+          <a:noFill/>
+        </p:spPr>
+        <p:txBody>
+          <a:bodyPr wrap="square" rtlCol="0">
+            <a:spAutoFit/>
+          </a:bodyPr>
+          <a:lstStyle/>
+          <a:p>
+            <a:pPr algn="ctr"/>
+            <a:r>
+              <a:rPr lang="fr-FR" sz="2800" dirty="0">
+                <a:solidFill>
+                  <a:schemeClr val="bg1"/>
+                </a:solidFill>
+              </a:rPr>
+              <a:t>Cas de l’emploi du temps de l’ESME SUDRIA</a:t>
+            </a:r>
+          </a:p>
+        </p:txBody>
+      </p:sp>
     </p:spTree>
     <p:extLst>
       <p:ext uri="{BB962C8B-B14F-4D97-AF65-F5344CB8AC3E}">
@@ -6049,7 +6015,7 @@
   <p:timing>
     <p:tnLst>
       <p:par>
-        <p:cTn xmlns:p14="http://schemas.microsoft.com/office/powerpoint/2010/main" id="1" dur="indefinite" restart="never" nodeType="tmRoot"/>
+        <p:cTn id="1" dur="indefinite" restart="never" nodeType="tmRoot"/>
       </p:par>
     </p:tnLst>
   </p:timing>
@@ -6148,8 +6114,16 @@
               <a:buChar char="§"/>
             </a:pPr>
             <a:r>
+              <a:rPr lang="fr-FR" sz="3200" dirty="0"/>
+              <a:t>É</a:t>
+            </a:r>
+            <a:r>
               <a:rPr lang="fr-FR" sz="3200" dirty="0" smtClean="0"/>
-              <a:t>Etapes de conception</a:t>
+              <a:t>tapes </a:t>
+            </a:r>
+            <a:r>
+              <a:rPr lang="fr-FR" sz="3200" dirty="0" smtClean="0"/>
+              <a:t>de conception</a:t>
             </a:r>
             <a:endParaRPr lang="fr-FR" sz="3200" dirty="0"/>
           </a:p>
@@ -6263,7 +6237,7 @@
   <p:timing>
     <p:tnLst>
       <p:par>
-        <p:cTn xmlns:p14="http://schemas.microsoft.com/office/powerpoint/2010/main" id="1" dur="indefinite" restart="never" nodeType="tmRoot"/>
+        <p:cTn id="1" dur="indefinite" restart="never" nodeType="tmRoot"/>
       </p:par>
     </p:tnLst>
   </p:timing>
@@ -6304,7 +6278,7 @@
           <a:p>
             <a:r>
               <a:rPr lang="fr-FR" dirty="0" smtClean="0"/>
-              <a:t>PRESENTATION</a:t>
+              <a:t>PRÉSENTATION</a:t>
             </a:r>
             <a:endParaRPr lang="fr-FR" dirty="0"/>
           </a:p>
@@ -6441,7 +6415,7 @@
   <p:timing>
     <p:tnLst>
       <p:par>
-        <p:cTn xmlns:p14="http://schemas.microsoft.com/office/powerpoint/2010/main" id="1" dur="indefinite" restart="never" nodeType="tmRoot"/>
+        <p:cTn id="1" dur="indefinite" restart="never" nodeType="tmRoot"/>
       </p:par>
     </p:tnLst>
   </p:timing>
@@ -6482,7 +6456,15 @@
           <a:p>
             <a:r>
               <a:rPr lang="fr-FR" dirty="0" smtClean="0"/>
-              <a:t>MISE EN FORME DES DONNEES</a:t>
+              <a:t>MODÉLISATION </a:t>
+            </a:r>
+            <a:r>
+              <a:rPr lang="fr-FR" dirty="0" smtClean="0"/>
+              <a:t>DES </a:t>
+            </a:r>
+            <a:r>
+              <a:rPr lang="fr-FR" dirty="0" smtClean="0"/>
+              <a:t>DONNÉES</a:t>
             </a:r>
             <a:endParaRPr lang="fr-FR" dirty="0"/>
           </a:p>
@@ -6500,7 +6482,7 @@
         </p:nvSpPr>
         <p:spPr>
           <a:xfrm>
-            <a:off x="2603733" y="6270171"/>
+            <a:off x="2603733" y="6304434"/>
             <a:ext cx="4188958" cy="508454"/>
           </a:xfrm>
         </p:spPr>
@@ -6557,36 +6539,1154 @@
           </a:p>
         </p:txBody>
       </p:sp>
-      <p:pic>
-        <p:nvPicPr>
-          <p:cNvPr id="5" name="Image 4" descr="DiagrammeClassePPT (2).png"/>
-          <p:cNvPicPr>
-            <a:picLocks noChangeAspect="1"/>
-          </p:cNvPicPr>
+      <p:grpSp>
+        <p:nvGrpSpPr>
+          <p:cNvPr id="13" name="Groupe 12"/>
+          <p:cNvGrpSpPr/>
           <p:nvPr/>
-        </p:nvPicPr>
-        <p:blipFill>
-          <a:blip r:embed="rId2">
-            <a:extLst>
-              <a:ext uri="{28A0092B-C50C-407E-A947-70E740481C1C}">
-                <a14:useLocalDpi xmlns:a14="http://schemas.microsoft.com/office/drawing/2010/main" val="0"/>
-              </a:ext>
-            </a:extLst>
-          </a:blip>
-          <a:stretch>
-            <a:fillRect/>
-          </a:stretch>
-        </p:blipFill>
+        </p:nvGrpSpPr>
+        <p:grpSpPr>
+          <a:xfrm>
+            <a:off x="419730" y="2582597"/>
+            <a:ext cx="1644363" cy="2218569"/>
+            <a:chOff x="959370" y="3197187"/>
+            <a:chExt cx="1644363" cy="2218569"/>
+          </a:xfrm>
+        </p:grpSpPr>
+        <p:grpSp>
+          <p:nvGrpSpPr>
+            <p:cNvPr id="12" name="Groupe 11"/>
+            <p:cNvGrpSpPr/>
+            <p:nvPr/>
+          </p:nvGrpSpPr>
+          <p:grpSpPr>
+            <a:xfrm>
+              <a:off x="959370" y="3197187"/>
+              <a:ext cx="1644363" cy="2218569"/>
+              <a:chOff x="959370" y="3197187"/>
+              <a:chExt cx="1644363" cy="2218569"/>
+            </a:xfrm>
+          </p:grpSpPr>
+          <p:sp>
+            <p:nvSpPr>
+              <p:cNvPr id="9" name="Rectangle à coins arrondis 8"/>
+              <p:cNvSpPr/>
+              <p:nvPr/>
+            </p:nvSpPr>
+            <p:spPr>
+              <a:xfrm>
+                <a:off x="959370" y="3657598"/>
+                <a:ext cx="1644363" cy="1758158"/>
+              </a:xfrm>
+              <a:prstGeom prst="roundRect">
+                <a:avLst>
+                  <a:gd name="adj" fmla="val 10286"/>
+                </a:avLst>
+              </a:prstGeom>
+              <a:noFill/>
+              <a:ln>
+                <a:solidFill>
+                  <a:schemeClr val="tx1"/>
+                </a:solidFill>
+              </a:ln>
+              <a:effectLst/>
+            </p:spPr>
+            <p:style>
+              <a:lnRef idx="1">
+                <a:schemeClr val="accent1"/>
+              </a:lnRef>
+              <a:fillRef idx="3">
+                <a:schemeClr val="accent1"/>
+              </a:fillRef>
+              <a:effectRef idx="2">
+                <a:schemeClr val="accent1"/>
+              </a:effectRef>
+              <a:fontRef idx="minor">
+                <a:schemeClr val="lt1"/>
+              </a:fontRef>
+            </p:style>
+            <p:txBody>
+              <a:bodyPr rtlCol="0" anchor="ctr"/>
+              <a:lstStyle/>
+              <a:p>
+                <a:pPr algn="ctr"/>
+                <a:endParaRPr lang="fr-FR"/>
+              </a:p>
+            </p:txBody>
+          </p:sp>
+          <p:sp>
+            <p:nvSpPr>
+              <p:cNvPr id="4" name="Rectangle à coins arrondis 3"/>
+              <p:cNvSpPr/>
+              <p:nvPr/>
+            </p:nvSpPr>
+            <p:spPr>
+              <a:xfrm>
+                <a:off x="959370" y="3197187"/>
+                <a:ext cx="1644363" cy="779488"/>
+              </a:xfrm>
+              <a:prstGeom prst="roundRect">
+                <a:avLst/>
+              </a:prstGeom>
+              <a:solidFill>
+                <a:srgbClr val="05BEFF"/>
+              </a:solidFill>
+              <a:ln>
+                <a:solidFill>
+                  <a:schemeClr val="bg2">
+                    <a:lumMod val="50000"/>
+                  </a:schemeClr>
+                </a:solidFill>
+              </a:ln>
+              <a:effectLst/>
+            </p:spPr>
+            <p:style>
+              <a:lnRef idx="1">
+                <a:schemeClr val="accent1"/>
+              </a:lnRef>
+              <a:fillRef idx="3">
+                <a:schemeClr val="accent1"/>
+              </a:fillRef>
+              <a:effectRef idx="2">
+                <a:schemeClr val="accent1"/>
+              </a:effectRef>
+              <a:fontRef idx="minor">
+                <a:schemeClr val="lt1"/>
+              </a:fontRef>
+            </p:style>
+            <p:txBody>
+              <a:bodyPr rtlCol="0" anchor="ctr"/>
+              <a:lstStyle/>
+              <a:p>
+                <a:pPr algn="ctr"/>
+                <a:r>
+                  <a:rPr lang="fr-FR" sz="3200" dirty="0"/>
+                  <a:t>C</a:t>
+                </a:r>
+                <a:r>
+                  <a:rPr lang="fr-FR" sz="3200" dirty="0" smtClean="0"/>
+                  <a:t>ours</a:t>
+                </a:r>
+                <a:endParaRPr lang="fr-FR" dirty="0"/>
+              </a:p>
+            </p:txBody>
+          </p:sp>
+        </p:grpSp>
+        <p:sp>
+          <p:nvSpPr>
+            <p:cNvPr id="10" name="ZoneTexte 9"/>
+            <p:cNvSpPr txBox="1"/>
+            <p:nvPr/>
+          </p:nvSpPr>
+          <p:spPr>
+            <a:xfrm>
+              <a:off x="959370" y="4092317"/>
+              <a:ext cx="1644363" cy="1323439"/>
+            </a:xfrm>
+            <a:prstGeom prst="rect">
+              <a:avLst/>
+            </a:prstGeom>
+            <a:noFill/>
+          </p:spPr>
+          <p:txBody>
+            <a:bodyPr wrap="square" rtlCol="0">
+              <a:spAutoFit/>
+            </a:bodyPr>
+            <a:lstStyle/>
+            <a:p>
+              <a:pPr marL="285750" indent="-285750">
+                <a:buFontTx/>
+                <a:buChar char="-"/>
+              </a:pPr>
+              <a:r>
+                <a:rPr lang="fr-FR" sz="2000" dirty="0" smtClean="0"/>
+                <a:t>Professeur</a:t>
+              </a:r>
+            </a:p>
+            <a:p>
+              <a:pPr marL="285750" indent="-285750">
+                <a:buFontTx/>
+                <a:buChar char="-"/>
+              </a:pPr>
+              <a:r>
+                <a:rPr lang="fr-FR" sz="2000" dirty="0" smtClean="0"/>
+                <a:t>Matière</a:t>
+              </a:r>
+            </a:p>
+            <a:p>
+              <a:pPr marL="285750" indent="-285750">
+                <a:buFontTx/>
+                <a:buChar char="-"/>
+              </a:pPr>
+              <a:r>
+                <a:rPr lang="fr-FR" sz="2000" dirty="0" smtClean="0"/>
+                <a:t>Classe</a:t>
+              </a:r>
+            </a:p>
+            <a:p>
+              <a:pPr marL="285750" indent="-285750">
+                <a:buFontTx/>
+                <a:buChar char="-"/>
+              </a:pPr>
+              <a:r>
+                <a:rPr lang="fr-FR" sz="2000" dirty="0" smtClean="0"/>
+                <a:t>Salle</a:t>
+              </a:r>
+              <a:endParaRPr lang="fr-FR" sz="2000" dirty="0"/>
+            </a:p>
+          </p:txBody>
+        </p:sp>
+      </p:grpSp>
+      <p:graphicFrame>
+        <p:nvGraphicFramePr>
+          <p:cNvPr id="11" name="Tableau 10"/>
+          <p:cNvGraphicFramePr>
+            <a:graphicFrameLocks noGrp="1"/>
+          </p:cNvGraphicFramePr>
+          <p:nvPr>
+            <p:extLst>
+              <p:ext uri="{D42A27DB-BD31-4B8C-83A1-F6EECF244321}">
+                <p14:modId xmlns:p14="http://schemas.microsoft.com/office/powerpoint/2010/main" val="269784474"/>
+              </p:ext>
+            </p:extLst>
+          </p:nvPr>
+        </p:nvGraphicFramePr>
+        <p:xfrm>
+          <a:off x="2743201" y="3669590"/>
+          <a:ext cx="6042355" cy="2302732"/>
+        </p:xfrm>
+        <a:graphic>
+          <a:graphicData uri="http://schemas.openxmlformats.org/drawingml/2006/table">
+            <a:tbl>
+              <a:tblPr firstRow="1" bandRow="1">
+                <a:tableStyleId>{F2DE63D5-997A-4646-A377-4702673A728D}</a:tableStyleId>
+              </a:tblPr>
+              <a:tblGrid>
+                <a:gridCol w="841230"/>
+                <a:gridCol w="781926"/>
+                <a:gridCol w="820240"/>
+                <a:gridCol w="1009379"/>
+                <a:gridCol w="735802"/>
+                <a:gridCol w="1045497"/>
+                <a:gridCol w="808281"/>
+              </a:tblGrid>
+              <a:tr h="694166">
+                <a:tc>
+                  <a:txBody>
+                    <a:bodyPr/>
+                    <a:lstStyle/>
+                    <a:p>
+                      <a:endParaRPr lang="fr-FR" dirty="0"/>
+                    </a:p>
+                  </a:txBody>
+                  <a:tcPr>
+                    <a:lnR w="12700" cap="flat" cmpd="sng" algn="ctr">
+                      <a:solidFill>
+                        <a:srgbClr val="000000"/>
+                      </a:solidFill>
+                      <a:prstDash val="solid"/>
+                      <a:round/>
+                      <a:headEnd type="none" w="med" len="med"/>
+                      <a:tailEnd type="none" w="med" len="med"/>
+                    </a:lnR>
+                    <a:lnB w="12700" cap="flat" cmpd="sng" algn="ctr">
+                      <a:solidFill>
+                        <a:srgbClr val="000000"/>
+                      </a:solidFill>
+                      <a:prstDash val="solid"/>
+                      <a:round/>
+                      <a:headEnd type="none" w="med" len="med"/>
+                      <a:tailEnd type="none" w="med" len="med"/>
+                    </a:lnB>
+                  </a:tcPr>
+                </a:tc>
+                <a:tc>
+                  <a:txBody>
+                    <a:bodyPr/>
+                    <a:lstStyle/>
+                    <a:p>
+                      <a:pPr algn="ctr"/>
+                      <a:r>
+                        <a:rPr lang="fr-FR" sz="1800" dirty="0" smtClean="0"/>
+                        <a:t>LUN</a:t>
+                      </a:r>
+                      <a:endParaRPr lang="fr-FR" sz="1200" dirty="0"/>
+                    </a:p>
+                  </a:txBody>
+                  <a:tcPr anchor="ctr">
+                    <a:lnL w="12700" cap="flat" cmpd="sng" algn="ctr">
+                      <a:solidFill>
+                        <a:srgbClr val="000000"/>
+                      </a:solidFill>
+                      <a:prstDash val="solid"/>
+                      <a:round/>
+                      <a:headEnd type="none" w="med" len="med"/>
+                      <a:tailEnd type="none" w="med" len="med"/>
+                    </a:lnL>
+                    <a:lnR w="12700" cap="flat" cmpd="sng" algn="ctr">
+                      <a:solidFill>
+                        <a:srgbClr val="000000"/>
+                      </a:solidFill>
+                      <a:prstDash val="solid"/>
+                      <a:round/>
+                      <a:headEnd type="none" w="med" len="med"/>
+                      <a:tailEnd type="none" w="med" len="med"/>
+                    </a:lnR>
+                    <a:lnB w="12700" cap="flat" cmpd="sng" algn="ctr">
+                      <a:solidFill>
+                        <a:srgbClr val="000000"/>
+                      </a:solidFill>
+                      <a:prstDash val="solid"/>
+                      <a:round/>
+                      <a:headEnd type="none" w="med" len="med"/>
+                      <a:tailEnd type="none" w="med" len="med"/>
+                    </a:lnB>
+                  </a:tcPr>
+                </a:tc>
+                <a:tc>
+                  <a:txBody>
+                    <a:bodyPr/>
+                    <a:lstStyle/>
+                    <a:p>
+                      <a:pPr algn="ctr"/>
+                      <a:r>
+                        <a:rPr lang="fr-FR" sz="1800" dirty="0" smtClean="0"/>
+                        <a:t>MAR</a:t>
+                      </a:r>
+                      <a:endParaRPr lang="fr-FR" dirty="0"/>
+                    </a:p>
+                  </a:txBody>
+                  <a:tcPr anchor="ctr">
+                    <a:lnL w="12700" cap="flat" cmpd="sng" algn="ctr">
+                      <a:solidFill>
+                        <a:srgbClr val="000000"/>
+                      </a:solidFill>
+                      <a:prstDash val="solid"/>
+                      <a:round/>
+                      <a:headEnd type="none" w="med" len="med"/>
+                      <a:tailEnd type="none" w="med" len="med"/>
+                    </a:lnL>
+                    <a:lnR w="12700" cap="flat" cmpd="sng" algn="ctr">
+                      <a:solidFill>
+                        <a:srgbClr val="000000"/>
+                      </a:solidFill>
+                      <a:prstDash val="solid"/>
+                      <a:round/>
+                      <a:headEnd type="none" w="med" len="med"/>
+                      <a:tailEnd type="none" w="med" len="med"/>
+                    </a:lnR>
+                    <a:lnB w="12700" cap="flat" cmpd="sng" algn="ctr">
+                      <a:solidFill>
+                        <a:srgbClr val="000000"/>
+                      </a:solidFill>
+                      <a:prstDash val="solid"/>
+                      <a:round/>
+                      <a:headEnd type="none" w="med" len="med"/>
+                      <a:tailEnd type="none" w="med" len="med"/>
+                    </a:lnB>
+                  </a:tcPr>
+                </a:tc>
+                <a:tc>
+                  <a:txBody>
+                    <a:bodyPr/>
+                    <a:lstStyle/>
+                    <a:p>
+                      <a:pPr algn="ctr"/>
+                      <a:r>
+                        <a:rPr lang="fr-FR" sz="1800" dirty="0" smtClean="0"/>
+                        <a:t>MER</a:t>
+                      </a:r>
+                      <a:endParaRPr lang="fr-FR" dirty="0"/>
+                    </a:p>
+                  </a:txBody>
+                  <a:tcPr anchor="ctr">
+                    <a:lnL w="12700" cap="flat" cmpd="sng" algn="ctr">
+                      <a:solidFill>
+                        <a:srgbClr val="000000"/>
+                      </a:solidFill>
+                      <a:prstDash val="solid"/>
+                      <a:round/>
+                      <a:headEnd type="none" w="med" len="med"/>
+                      <a:tailEnd type="none" w="med" len="med"/>
+                    </a:lnL>
+                    <a:lnR w="12700" cap="flat" cmpd="sng" algn="ctr">
+                      <a:solidFill>
+                        <a:srgbClr val="000000"/>
+                      </a:solidFill>
+                      <a:prstDash val="solid"/>
+                      <a:round/>
+                      <a:headEnd type="none" w="med" len="med"/>
+                      <a:tailEnd type="none" w="med" len="med"/>
+                    </a:lnR>
+                    <a:lnB w="12700" cap="flat" cmpd="sng" algn="ctr">
+                      <a:solidFill>
+                        <a:srgbClr val="000000"/>
+                      </a:solidFill>
+                      <a:prstDash val="solid"/>
+                      <a:round/>
+                      <a:headEnd type="none" w="med" len="med"/>
+                      <a:tailEnd type="none" w="med" len="med"/>
+                    </a:lnB>
+                  </a:tcPr>
+                </a:tc>
+                <a:tc>
+                  <a:txBody>
+                    <a:bodyPr/>
+                    <a:lstStyle/>
+                    <a:p>
+                      <a:pPr algn="ctr"/>
+                      <a:r>
+                        <a:rPr lang="fr-FR" sz="1800" dirty="0" smtClean="0"/>
+                        <a:t>JEU</a:t>
+                      </a:r>
+                      <a:endParaRPr lang="fr-FR" dirty="0"/>
+                    </a:p>
+                  </a:txBody>
+                  <a:tcPr anchor="ctr">
+                    <a:lnL w="12700" cap="flat" cmpd="sng" algn="ctr">
+                      <a:solidFill>
+                        <a:srgbClr val="000000"/>
+                      </a:solidFill>
+                      <a:prstDash val="solid"/>
+                      <a:round/>
+                      <a:headEnd type="none" w="med" len="med"/>
+                      <a:tailEnd type="none" w="med" len="med"/>
+                    </a:lnL>
+                    <a:lnR w="12700" cap="flat" cmpd="sng" algn="ctr">
+                      <a:solidFill>
+                        <a:srgbClr val="000000"/>
+                      </a:solidFill>
+                      <a:prstDash val="solid"/>
+                      <a:round/>
+                      <a:headEnd type="none" w="med" len="med"/>
+                      <a:tailEnd type="none" w="med" len="med"/>
+                    </a:lnR>
+                    <a:lnB w="12700" cap="flat" cmpd="sng" algn="ctr">
+                      <a:solidFill>
+                        <a:srgbClr val="000000"/>
+                      </a:solidFill>
+                      <a:prstDash val="solid"/>
+                      <a:round/>
+                      <a:headEnd type="none" w="med" len="med"/>
+                      <a:tailEnd type="none" w="med" len="med"/>
+                    </a:lnB>
+                  </a:tcPr>
+                </a:tc>
+                <a:tc>
+                  <a:txBody>
+                    <a:bodyPr/>
+                    <a:lstStyle/>
+                    <a:p>
+                      <a:pPr algn="ctr"/>
+                      <a:r>
+                        <a:rPr lang="fr-FR" dirty="0" smtClean="0"/>
+                        <a:t>VEN</a:t>
+                      </a:r>
+                      <a:endParaRPr lang="fr-FR" dirty="0"/>
+                    </a:p>
+                  </a:txBody>
+                  <a:tcPr anchor="ctr">
+                    <a:lnL w="12700" cap="flat" cmpd="sng" algn="ctr">
+                      <a:solidFill>
+                        <a:srgbClr val="000000"/>
+                      </a:solidFill>
+                      <a:prstDash val="solid"/>
+                      <a:round/>
+                      <a:headEnd type="none" w="med" len="med"/>
+                      <a:tailEnd type="none" w="med" len="med"/>
+                    </a:lnL>
+                    <a:lnR w="12700" cap="flat" cmpd="sng" algn="ctr">
+                      <a:solidFill>
+                        <a:srgbClr val="000000"/>
+                      </a:solidFill>
+                      <a:prstDash val="solid"/>
+                      <a:round/>
+                      <a:headEnd type="none" w="med" len="med"/>
+                      <a:tailEnd type="none" w="med" len="med"/>
+                    </a:lnR>
+                    <a:lnB w="12700" cap="flat" cmpd="sng" algn="ctr">
+                      <a:solidFill>
+                        <a:srgbClr val="000000"/>
+                      </a:solidFill>
+                      <a:prstDash val="solid"/>
+                      <a:round/>
+                      <a:headEnd type="none" w="med" len="med"/>
+                      <a:tailEnd type="none" w="med" len="med"/>
+                    </a:lnB>
+                  </a:tcPr>
+                </a:tc>
+                <a:tc>
+                  <a:txBody>
+                    <a:bodyPr/>
+                    <a:lstStyle/>
+                    <a:p>
+                      <a:pPr algn="ctr"/>
+                      <a:r>
+                        <a:rPr lang="fr-FR" dirty="0" smtClean="0"/>
+                        <a:t>SAM</a:t>
+                      </a:r>
+                      <a:endParaRPr lang="fr-FR" dirty="0"/>
+                    </a:p>
+                  </a:txBody>
+                  <a:tcPr anchor="ctr">
+                    <a:lnL w="12700" cap="flat" cmpd="sng" algn="ctr">
+                      <a:solidFill>
+                        <a:srgbClr val="000000"/>
+                      </a:solidFill>
+                      <a:prstDash val="solid"/>
+                      <a:round/>
+                      <a:headEnd type="none" w="med" len="med"/>
+                      <a:tailEnd type="none" w="med" len="med"/>
+                    </a:lnL>
+                    <a:lnB w="12700" cap="flat" cmpd="sng" algn="ctr">
+                      <a:solidFill>
+                        <a:srgbClr val="000000"/>
+                      </a:solidFill>
+                      <a:prstDash val="solid"/>
+                      <a:round/>
+                      <a:headEnd type="none" w="med" len="med"/>
+                      <a:tailEnd type="none" w="med" len="med"/>
+                    </a:lnB>
+                  </a:tcPr>
+                </a:tc>
+              </a:tr>
+              <a:tr h="694166">
+                <a:tc>
+                  <a:txBody>
+                    <a:bodyPr/>
+                    <a:lstStyle/>
+                    <a:p>
+                      <a:r>
+                        <a:rPr lang="fr-FR" dirty="0" smtClean="0"/>
+                        <a:t>Matin</a:t>
+                      </a:r>
+                    </a:p>
+                    <a:p>
+                      <a:r>
+                        <a:rPr lang="fr-FR" dirty="0" smtClean="0"/>
+                        <a:t>(4H)</a:t>
+                      </a:r>
+                      <a:endParaRPr lang="fr-FR" dirty="0"/>
+                    </a:p>
+                  </a:txBody>
+                  <a:tcPr>
+                    <a:lnR w="12700" cap="flat" cmpd="sng" algn="ctr">
+                      <a:solidFill>
+                        <a:srgbClr val="000000"/>
+                      </a:solidFill>
+                      <a:prstDash val="solid"/>
+                      <a:round/>
+                      <a:headEnd type="none" w="med" len="med"/>
+                      <a:tailEnd type="none" w="med" len="med"/>
+                    </a:lnR>
+                    <a:lnT w="12700" cap="flat" cmpd="sng" algn="ctr">
+                      <a:solidFill>
+                        <a:srgbClr val="000000"/>
+                      </a:solidFill>
+                      <a:prstDash val="solid"/>
+                      <a:round/>
+                      <a:headEnd type="none" w="med" len="med"/>
+                      <a:tailEnd type="none" w="med" len="med"/>
+                    </a:lnT>
+                    <a:lnB w="12700" cap="flat" cmpd="sng" algn="ctr">
+                      <a:solidFill>
+                        <a:srgbClr val="000000"/>
+                      </a:solidFill>
+                      <a:prstDash val="solid"/>
+                      <a:round/>
+                      <a:headEnd type="none" w="med" len="med"/>
+                      <a:tailEnd type="none" w="med" len="med"/>
+                    </a:lnB>
+                  </a:tcPr>
+                </a:tc>
+                <a:tc>
+                  <a:txBody>
+                    <a:bodyPr/>
+                    <a:lstStyle/>
+                    <a:p>
+                      <a:pPr algn="ctr"/>
+                      <a:endParaRPr lang="fr-FR" sz="2400" dirty="0"/>
+                    </a:p>
+                  </a:txBody>
+                  <a:tcPr anchor="ctr">
+                    <a:lnL w="12700" cap="flat" cmpd="sng" algn="ctr">
+                      <a:solidFill>
+                        <a:srgbClr val="000000"/>
+                      </a:solidFill>
+                      <a:prstDash val="solid"/>
+                      <a:round/>
+                      <a:headEnd type="none" w="med" len="med"/>
+                      <a:tailEnd type="none" w="med" len="med"/>
+                    </a:lnL>
+                    <a:lnR w="12700" cap="flat" cmpd="sng" algn="ctr">
+                      <a:solidFill>
+                        <a:srgbClr val="000000"/>
+                      </a:solidFill>
+                      <a:prstDash val="solid"/>
+                      <a:round/>
+                      <a:headEnd type="none" w="med" len="med"/>
+                      <a:tailEnd type="none" w="med" len="med"/>
+                    </a:lnR>
+                    <a:lnT w="12700" cap="flat" cmpd="sng" algn="ctr">
+                      <a:solidFill>
+                        <a:srgbClr val="000000"/>
+                      </a:solidFill>
+                      <a:prstDash val="solid"/>
+                      <a:round/>
+                      <a:headEnd type="none" w="med" len="med"/>
+                      <a:tailEnd type="none" w="med" len="med"/>
+                    </a:lnT>
+                    <a:lnB w="12700" cap="flat" cmpd="sng" algn="ctr">
+                      <a:solidFill>
+                        <a:srgbClr val="000000"/>
+                      </a:solidFill>
+                      <a:prstDash val="solid"/>
+                      <a:round/>
+                      <a:headEnd type="none" w="med" len="med"/>
+                      <a:tailEnd type="none" w="med" len="med"/>
+                    </a:lnB>
+                  </a:tcPr>
+                </a:tc>
+                <a:tc>
+                  <a:txBody>
+                    <a:bodyPr/>
+                    <a:lstStyle/>
+                    <a:p>
+                      <a:pPr algn="ctr"/>
+                      <a:endParaRPr lang="fr-FR" sz="2400" dirty="0"/>
+                    </a:p>
+                  </a:txBody>
+                  <a:tcPr anchor="ctr">
+                    <a:lnL w="12700" cap="flat" cmpd="sng" algn="ctr">
+                      <a:solidFill>
+                        <a:srgbClr val="000000"/>
+                      </a:solidFill>
+                      <a:prstDash val="solid"/>
+                      <a:round/>
+                      <a:headEnd type="none" w="med" len="med"/>
+                      <a:tailEnd type="none" w="med" len="med"/>
+                    </a:lnL>
+                    <a:lnR w="12700" cap="flat" cmpd="sng" algn="ctr">
+                      <a:solidFill>
+                        <a:srgbClr val="000000"/>
+                      </a:solidFill>
+                      <a:prstDash val="solid"/>
+                      <a:round/>
+                      <a:headEnd type="none" w="med" len="med"/>
+                      <a:tailEnd type="none" w="med" len="med"/>
+                    </a:lnR>
+                    <a:lnT w="12700" cap="flat" cmpd="sng" algn="ctr">
+                      <a:solidFill>
+                        <a:srgbClr val="000000"/>
+                      </a:solidFill>
+                      <a:prstDash val="solid"/>
+                      <a:round/>
+                      <a:headEnd type="none" w="med" len="med"/>
+                      <a:tailEnd type="none" w="med" len="med"/>
+                    </a:lnT>
+                    <a:lnB w="12700" cap="flat" cmpd="sng" algn="ctr">
+                      <a:solidFill>
+                        <a:srgbClr val="000000"/>
+                      </a:solidFill>
+                      <a:prstDash val="solid"/>
+                      <a:round/>
+                      <a:headEnd type="none" w="med" len="med"/>
+                      <a:tailEnd type="none" w="med" len="med"/>
+                    </a:lnB>
+                  </a:tcPr>
+                </a:tc>
+                <a:tc>
+                  <a:txBody>
+                    <a:bodyPr/>
+                    <a:lstStyle/>
+                    <a:p>
+                      <a:pPr algn="ctr"/>
+                      <a:endParaRPr lang="fr-FR" sz="2400" dirty="0"/>
+                    </a:p>
+                  </a:txBody>
+                  <a:tcPr anchor="ctr">
+                    <a:lnL w="12700" cap="flat" cmpd="sng" algn="ctr">
+                      <a:solidFill>
+                        <a:srgbClr val="000000"/>
+                      </a:solidFill>
+                      <a:prstDash val="solid"/>
+                      <a:round/>
+                      <a:headEnd type="none" w="med" len="med"/>
+                      <a:tailEnd type="none" w="med" len="med"/>
+                    </a:lnL>
+                    <a:lnR w="12700" cap="flat" cmpd="sng" algn="ctr">
+                      <a:solidFill>
+                        <a:srgbClr val="000000"/>
+                      </a:solidFill>
+                      <a:prstDash val="solid"/>
+                      <a:round/>
+                      <a:headEnd type="none" w="med" len="med"/>
+                      <a:tailEnd type="none" w="med" len="med"/>
+                    </a:lnR>
+                    <a:lnT w="12700" cap="flat" cmpd="sng" algn="ctr">
+                      <a:solidFill>
+                        <a:srgbClr val="000000"/>
+                      </a:solidFill>
+                      <a:prstDash val="solid"/>
+                      <a:round/>
+                      <a:headEnd type="none" w="med" len="med"/>
+                      <a:tailEnd type="none" w="med" len="med"/>
+                    </a:lnT>
+                    <a:lnB w="12700" cap="flat" cmpd="sng" algn="ctr">
+                      <a:solidFill>
+                        <a:srgbClr val="000000"/>
+                      </a:solidFill>
+                      <a:prstDash val="solid"/>
+                      <a:round/>
+                      <a:headEnd type="none" w="med" len="med"/>
+                      <a:tailEnd type="none" w="med" len="med"/>
+                    </a:lnB>
+                  </a:tcPr>
+                </a:tc>
+                <a:tc>
+                  <a:txBody>
+                    <a:bodyPr/>
+                    <a:lstStyle/>
+                    <a:p>
+                      <a:pPr algn="ctr"/>
+                      <a:endParaRPr lang="fr-FR" sz="2400" dirty="0"/>
+                    </a:p>
+                  </a:txBody>
+                  <a:tcPr anchor="ctr">
+                    <a:lnL w="12700" cap="flat" cmpd="sng" algn="ctr">
+                      <a:solidFill>
+                        <a:srgbClr val="000000"/>
+                      </a:solidFill>
+                      <a:prstDash val="solid"/>
+                      <a:round/>
+                      <a:headEnd type="none" w="med" len="med"/>
+                      <a:tailEnd type="none" w="med" len="med"/>
+                    </a:lnL>
+                    <a:lnR w="12700" cap="flat" cmpd="sng" algn="ctr">
+                      <a:solidFill>
+                        <a:srgbClr val="000000"/>
+                      </a:solidFill>
+                      <a:prstDash val="solid"/>
+                      <a:round/>
+                      <a:headEnd type="none" w="med" len="med"/>
+                      <a:tailEnd type="none" w="med" len="med"/>
+                    </a:lnR>
+                    <a:lnT w="12700" cap="flat" cmpd="sng" algn="ctr">
+                      <a:solidFill>
+                        <a:srgbClr val="000000"/>
+                      </a:solidFill>
+                      <a:prstDash val="solid"/>
+                      <a:round/>
+                      <a:headEnd type="none" w="med" len="med"/>
+                      <a:tailEnd type="none" w="med" len="med"/>
+                    </a:lnT>
+                    <a:lnB w="12700" cap="flat" cmpd="sng" algn="ctr">
+                      <a:solidFill>
+                        <a:srgbClr val="000000"/>
+                      </a:solidFill>
+                      <a:prstDash val="solid"/>
+                      <a:round/>
+                      <a:headEnd type="none" w="med" len="med"/>
+                      <a:tailEnd type="none" w="med" len="med"/>
+                    </a:lnB>
+                  </a:tcPr>
+                </a:tc>
+                <a:tc>
+                  <a:txBody>
+                    <a:bodyPr/>
+                    <a:lstStyle/>
+                    <a:p>
+                      <a:pPr algn="ctr"/>
+                      <a:endParaRPr lang="fr-FR" sz="2400" dirty="0"/>
+                    </a:p>
+                  </a:txBody>
+                  <a:tcPr anchor="ctr">
+                    <a:lnL w="12700" cap="flat" cmpd="sng" algn="ctr">
+                      <a:solidFill>
+                        <a:srgbClr val="000000"/>
+                      </a:solidFill>
+                      <a:prstDash val="solid"/>
+                      <a:round/>
+                      <a:headEnd type="none" w="med" len="med"/>
+                      <a:tailEnd type="none" w="med" len="med"/>
+                    </a:lnL>
+                    <a:lnR w="12700" cap="flat" cmpd="sng" algn="ctr">
+                      <a:solidFill>
+                        <a:srgbClr val="000000"/>
+                      </a:solidFill>
+                      <a:prstDash val="solid"/>
+                      <a:round/>
+                      <a:headEnd type="none" w="med" len="med"/>
+                      <a:tailEnd type="none" w="med" len="med"/>
+                    </a:lnR>
+                    <a:lnT w="12700" cap="flat" cmpd="sng" algn="ctr">
+                      <a:solidFill>
+                        <a:srgbClr val="000000"/>
+                      </a:solidFill>
+                      <a:prstDash val="solid"/>
+                      <a:round/>
+                      <a:headEnd type="none" w="med" len="med"/>
+                      <a:tailEnd type="none" w="med" len="med"/>
+                    </a:lnT>
+                    <a:lnB w="12700" cap="flat" cmpd="sng" algn="ctr">
+                      <a:solidFill>
+                        <a:srgbClr val="000000"/>
+                      </a:solidFill>
+                      <a:prstDash val="solid"/>
+                      <a:round/>
+                      <a:headEnd type="none" w="med" len="med"/>
+                      <a:tailEnd type="none" w="med" len="med"/>
+                    </a:lnB>
+                  </a:tcPr>
+                </a:tc>
+                <a:tc>
+                  <a:txBody>
+                    <a:bodyPr/>
+                    <a:lstStyle/>
+                    <a:p>
+                      <a:pPr algn="ctr"/>
+                      <a:endParaRPr lang="fr-FR" sz="2400" dirty="0"/>
+                    </a:p>
+                  </a:txBody>
+                  <a:tcPr anchor="ctr">
+                    <a:lnL w="12700" cap="flat" cmpd="sng" algn="ctr">
+                      <a:solidFill>
+                        <a:srgbClr val="000000"/>
+                      </a:solidFill>
+                      <a:prstDash val="solid"/>
+                      <a:round/>
+                      <a:headEnd type="none" w="med" len="med"/>
+                      <a:tailEnd type="none" w="med" len="med"/>
+                    </a:lnL>
+                    <a:lnT w="12700" cap="flat" cmpd="sng" algn="ctr">
+                      <a:solidFill>
+                        <a:srgbClr val="000000"/>
+                      </a:solidFill>
+                      <a:prstDash val="solid"/>
+                      <a:round/>
+                      <a:headEnd type="none" w="med" len="med"/>
+                      <a:tailEnd type="none" w="med" len="med"/>
+                    </a:lnT>
+                    <a:lnB w="12700" cap="flat" cmpd="sng" algn="ctr">
+                      <a:solidFill>
+                        <a:srgbClr val="000000"/>
+                      </a:solidFill>
+                      <a:prstDash val="solid"/>
+                      <a:round/>
+                      <a:headEnd type="none" w="med" len="med"/>
+                      <a:tailEnd type="none" w="med" len="med"/>
+                    </a:lnB>
+                  </a:tcPr>
+                </a:tc>
+              </a:tr>
+              <a:tr h="766432">
+                <a:tc>
+                  <a:txBody>
+                    <a:bodyPr/>
+                    <a:lstStyle/>
+                    <a:p>
+                      <a:r>
+                        <a:rPr lang="fr-FR" dirty="0" smtClean="0"/>
+                        <a:t>Après-midi</a:t>
+                      </a:r>
+                    </a:p>
+                    <a:p>
+                      <a:r>
+                        <a:rPr lang="fr-FR" dirty="0" smtClean="0"/>
+                        <a:t>(4H)</a:t>
+                      </a:r>
+                      <a:endParaRPr lang="fr-FR" dirty="0"/>
+                    </a:p>
+                  </a:txBody>
+                  <a:tcPr>
+                    <a:lnR w="12700" cap="flat" cmpd="sng" algn="ctr">
+                      <a:solidFill>
+                        <a:srgbClr val="000000"/>
+                      </a:solidFill>
+                      <a:prstDash val="solid"/>
+                      <a:round/>
+                      <a:headEnd type="none" w="med" len="med"/>
+                      <a:tailEnd type="none" w="med" len="med"/>
+                    </a:lnR>
+                    <a:lnT w="12700" cap="flat" cmpd="sng" algn="ctr">
+                      <a:solidFill>
+                        <a:srgbClr val="000000"/>
+                      </a:solidFill>
+                      <a:prstDash val="solid"/>
+                      <a:round/>
+                      <a:headEnd type="none" w="med" len="med"/>
+                      <a:tailEnd type="none" w="med" len="med"/>
+                    </a:lnT>
+                  </a:tcPr>
+                </a:tc>
+                <a:tc>
+                  <a:txBody>
+                    <a:bodyPr/>
+                    <a:lstStyle/>
+                    <a:p>
+                      <a:pPr algn="ctr"/>
+                      <a:endParaRPr lang="fr-FR" sz="2400" dirty="0"/>
+                    </a:p>
+                  </a:txBody>
+                  <a:tcPr anchor="ctr">
+                    <a:lnL w="12700" cap="flat" cmpd="sng" algn="ctr">
+                      <a:solidFill>
+                        <a:srgbClr val="000000"/>
+                      </a:solidFill>
+                      <a:prstDash val="solid"/>
+                      <a:round/>
+                      <a:headEnd type="none" w="med" len="med"/>
+                      <a:tailEnd type="none" w="med" len="med"/>
+                    </a:lnL>
+                    <a:lnR w="12700" cap="flat" cmpd="sng" algn="ctr">
+                      <a:solidFill>
+                        <a:srgbClr val="000000"/>
+                      </a:solidFill>
+                      <a:prstDash val="solid"/>
+                      <a:round/>
+                      <a:headEnd type="none" w="med" len="med"/>
+                      <a:tailEnd type="none" w="med" len="med"/>
+                    </a:lnR>
+                    <a:lnT w="12700" cap="flat" cmpd="sng" algn="ctr">
+                      <a:solidFill>
+                        <a:srgbClr val="000000"/>
+                      </a:solidFill>
+                      <a:prstDash val="solid"/>
+                      <a:round/>
+                      <a:headEnd type="none" w="med" len="med"/>
+                      <a:tailEnd type="none" w="med" len="med"/>
+                    </a:lnT>
+                  </a:tcPr>
+                </a:tc>
+                <a:tc>
+                  <a:txBody>
+                    <a:bodyPr/>
+                    <a:lstStyle/>
+                    <a:p>
+                      <a:pPr algn="ctr"/>
+                      <a:endParaRPr lang="fr-FR" sz="2400" dirty="0"/>
+                    </a:p>
+                  </a:txBody>
+                  <a:tcPr anchor="ctr">
+                    <a:lnL w="12700" cap="flat" cmpd="sng" algn="ctr">
+                      <a:solidFill>
+                        <a:srgbClr val="000000"/>
+                      </a:solidFill>
+                      <a:prstDash val="solid"/>
+                      <a:round/>
+                      <a:headEnd type="none" w="med" len="med"/>
+                      <a:tailEnd type="none" w="med" len="med"/>
+                    </a:lnL>
+                    <a:lnR w="12700" cap="flat" cmpd="sng" algn="ctr">
+                      <a:solidFill>
+                        <a:srgbClr val="000000"/>
+                      </a:solidFill>
+                      <a:prstDash val="solid"/>
+                      <a:round/>
+                      <a:headEnd type="none" w="med" len="med"/>
+                      <a:tailEnd type="none" w="med" len="med"/>
+                    </a:lnR>
+                    <a:lnT w="12700" cap="flat" cmpd="sng" algn="ctr">
+                      <a:solidFill>
+                        <a:srgbClr val="000000"/>
+                      </a:solidFill>
+                      <a:prstDash val="solid"/>
+                      <a:round/>
+                      <a:headEnd type="none" w="med" len="med"/>
+                      <a:tailEnd type="none" w="med" len="med"/>
+                    </a:lnT>
+                  </a:tcPr>
+                </a:tc>
+                <a:tc>
+                  <a:txBody>
+                    <a:bodyPr/>
+                    <a:lstStyle/>
+                    <a:p>
+                      <a:pPr algn="ctr"/>
+                      <a:endParaRPr lang="fr-FR" sz="2400" dirty="0"/>
+                    </a:p>
+                  </a:txBody>
+                  <a:tcPr anchor="ctr">
+                    <a:lnL w="12700" cap="flat" cmpd="sng" algn="ctr">
+                      <a:solidFill>
+                        <a:srgbClr val="000000"/>
+                      </a:solidFill>
+                      <a:prstDash val="solid"/>
+                      <a:round/>
+                      <a:headEnd type="none" w="med" len="med"/>
+                      <a:tailEnd type="none" w="med" len="med"/>
+                    </a:lnL>
+                    <a:lnR w="12700" cap="flat" cmpd="sng" algn="ctr">
+                      <a:solidFill>
+                        <a:srgbClr val="000000"/>
+                      </a:solidFill>
+                      <a:prstDash val="solid"/>
+                      <a:round/>
+                      <a:headEnd type="none" w="med" len="med"/>
+                      <a:tailEnd type="none" w="med" len="med"/>
+                    </a:lnR>
+                    <a:lnT w="12700" cap="flat" cmpd="sng" algn="ctr">
+                      <a:solidFill>
+                        <a:srgbClr val="000000"/>
+                      </a:solidFill>
+                      <a:prstDash val="solid"/>
+                      <a:round/>
+                      <a:headEnd type="none" w="med" len="med"/>
+                      <a:tailEnd type="none" w="med" len="med"/>
+                    </a:lnT>
+                  </a:tcPr>
+                </a:tc>
+                <a:tc>
+                  <a:txBody>
+                    <a:bodyPr/>
+                    <a:lstStyle/>
+                    <a:p>
+                      <a:pPr algn="ctr"/>
+                      <a:endParaRPr lang="fr-FR" sz="2400" dirty="0"/>
+                    </a:p>
+                  </a:txBody>
+                  <a:tcPr anchor="ctr">
+                    <a:lnL w="12700" cap="flat" cmpd="sng" algn="ctr">
+                      <a:solidFill>
+                        <a:srgbClr val="000000"/>
+                      </a:solidFill>
+                      <a:prstDash val="solid"/>
+                      <a:round/>
+                      <a:headEnd type="none" w="med" len="med"/>
+                      <a:tailEnd type="none" w="med" len="med"/>
+                    </a:lnL>
+                    <a:lnR w="12700" cap="flat" cmpd="sng" algn="ctr">
+                      <a:solidFill>
+                        <a:srgbClr val="000000"/>
+                      </a:solidFill>
+                      <a:prstDash val="solid"/>
+                      <a:round/>
+                      <a:headEnd type="none" w="med" len="med"/>
+                      <a:tailEnd type="none" w="med" len="med"/>
+                    </a:lnR>
+                    <a:lnT w="12700" cap="flat" cmpd="sng" algn="ctr">
+                      <a:solidFill>
+                        <a:srgbClr val="000000"/>
+                      </a:solidFill>
+                      <a:prstDash val="solid"/>
+                      <a:round/>
+                      <a:headEnd type="none" w="med" len="med"/>
+                      <a:tailEnd type="none" w="med" len="med"/>
+                    </a:lnT>
+                  </a:tcPr>
+                </a:tc>
+                <a:tc>
+                  <a:txBody>
+                    <a:bodyPr/>
+                    <a:lstStyle/>
+                    <a:p>
+                      <a:pPr algn="ctr"/>
+                      <a:endParaRPr lang="fr-FR" sz="2400" dirty="0"/>
+                    </a:p>
+                  </a:txBody>
+                  <a:tcPr anchor="ctr">
+                    <a:lnL w="12700" cap="flat" cmpd="sng" algn="ctr">
+                      <a:solidFill>
+                        <a:srgbClr val="000000"/>
+                      </a:solidFill>
+                      <a:prstDash val="solid"/>
+                      <a:round/>
+                      <a:headEnd type="none" w="med" len="med"/>
+                      <a:tailEnd type="none" w="med" len="med"/>
+                    </a:lnL>
+                    <a:lnR w="12700" cap="flat" cmpd="sng" algn="ctr">
+                      <a:solidFill>
+                        <a:srgbClr val="000000"/>
+                      </a:solidFill>
+                      <a:prstDash val="solid"/>
+                      <a:round/>
+                      <a:headEnd type="none" w="med" len="med"/>
+                      <a:tailEnd type="none" w="med" len="med"/>
+                    </a:lnR>
+                    <a:lnT w="12700" cap="flat" cmpd="sng" algn="ctr">
+                      <a:solidFill>
+                        <a:srgbClr val="000000"/>
+                      </a:solidFill>
+                      <a:prstDash val="solid"/>
+                      <a:round/>
+                      <a:headEnd type="none" w="med" len="med"/>
+                      <a:tailEnd type="none" w="med" len="med"/>
+                    </a:lnT>
+                  </a:tcPr>
+                </a:tc>
+                <a:tc>
+                  <a:txBody>
+                    <a:bodyPr/>
+                    <a:lstStyle/>
+                    <a:p>
+                      <a:pPr algn="ctr"/>
+                      <a:endParaRPr lang="fr-FR" sz="2400" dirty="0"/>
+                    </a:p>
+                  </a:txBody>
+                  <a:tcPr anchor="ctr">
+                    <a:lnL w="12700" cap="flat" cmpd="sng" algn="ctr">
+                      <a:solidFill>
+                        <a:srgbClr val="000000"/>
+                      </a:solidFill>
+                      <a:prstDash val="solid"/>
+                      <a:round/>
+                      <a:headEnd type="none" w="med" len="med"/>
+                      <a:tailEnd type="none" w="med" len="med"/>
+                    </a:lnL>
+                    <a:lnT w="12700" cap="flat" cmpd="sng" algn="ctr">
+                      <a:solidFill>
+                        <a:srgbClr val="000000"/>
+                      </a:solidFill>
+                      <a:prstDash val="solid"/>
+                      <a:round/>
+                      <a:headEnd type="none" w="med" len="med"/>
+                      <a:tailEnd type="none" w="med" len="med"/>
+                    </a:lnT>
+                  </a:tcPr>
+                </a:tc>
+              </a:tr>
+            </a:tbl>
+          </a:graphicData>
+        </a:graphic>
+      </p:graphicFrame>
+      <p:cxnSp>
+        <p:nvCxnSpPr>
+          <p:cNvPr id="15" name="Connecteur droit avec flèche 14"/>
+          <p:cNvCxnSpPr/>
+          <p:nvPr/>
+        </p:nvCxnSpPr>
         <p:spPr>
           <a:xfrm>
-            <a:off x="-38487" y="2185273"/>
-            <a:ext cx="9144000" cy="4354286"/>
+            <a:off x="2064093" y="3043008"/>
+            <a:ext cx="1878320" cy="1706206"/>
           </a:xfrm>
-          <a:prstGeom prst="rect">
+          <a:prstGeom prst="straightConnector1">
             <a:avLst/>
           </a:prstGeom>
+          <a:ln>
+            <a:solidFill>
+              <a:schemeClr val="bg2">
+                <a:lumMod val="50000"/>
+              </a:schemeClr>
+            </a:solidFill>
+            <a:tailEnd type="arrow"/>
+          </a:ln>
         </p:spPr>
-      </p:pic>
+        <p:style>
+          <a:lnRef idx="2">
+            <a:schemeClr val="accent1"/>
+          </a:lnRef>
+          <a:fillRef idx="0">
+            <a:schemeClr val="accent1"/>
+          </a:fillRef>
+          <a:effectRef idx="1">
+            <a:schemeClr val="accent1"/>
+          </a:effectRef>
+          <a:fontRef idx="minor">
+            <a:schemeClr val="tx1"/>
+          </a:fontRef>
+        </p:style>
+      </p:cxnSp>
     </p:spTree>
     <p:extLst>
       <p:ext uri="{BB962C8B-B14F-4D97-AF65-F5344CB8AC3E}">
@@ -6600,7 +7700,110 @@
   <p:timing>
     <p:tnLst>
       <p:par>
-        <p:cTn xmlns:p14="http://schemas.microsoft.com/office/powerpoint/2010/main" id="1" dur="indefinite" restart="never" nodeType="tmRoot"/>
+        <p:cTn id="1" dur="indefinite" restart="never" nodeType="tmRoot">
+          <p:childTnLst>
+            <p:seq concurrent="1" nextAc="seek">
+              <p:cTn id="2" dur="indefinite" nodeType="mainSeq">
+                <p:childTnLst>
+                  <p:par>
+                    <p:cTn id="3" fill="hold">
+                      <p:stCondLst>
+                        <p:cond delay="indefinite"/>
+                      </p:stCondLst>
+                      <p:childTnLst>
+                        <p:par>
+                          <p:cTn id="4" fill="hold">
+                            <p:stCondLst>
+                              <p:cond delay="0"/>
+                            </p:stCondLst>
+                            <p:childTnLst>
+                              <p:par>
+                                <p:cTn id="5" presetID="1" presetClass="entr" presetSubtype="0" fill="hold" nodeType="clickEffect">
+                                  <p:stCondLst>
+                                    <p:cond delay="0"/>
+                                  </p:stCondLst>
+                                  <p:childTnLst>
+                                    <p:set>
+                                      <p:cBhvr>
+                                        <p:cTn id="6" dur="1" fill="hold">
+                                          <p:stCondLst>
+                                            <p:cond delay="0"/>
+                                          </p:stCondLst>
+                                        </p:cTn>
+                                        <p:tgtEl>
+                                          <p:spTgt spid="11"/>
+                                        </p:tgtEl>
+                                        <p:attrNameLst>
+                                          <p:attrName>style.visibility</p:attrName>
+                                        </p:attrNameLst>
+                                      </p:cBhvr>
+                                      <p:to>
+                                        <p:strVal val="visible"/>
+                                      </p:to>
+                                    </p:set>
+                                  </p:childTnLst>
+                                </p:cTn>
+                              </p:par>
+                              <p:par>
+                                <p:cTn id="7" presetID="22" presetClass="entr" presetSubtype="1" fill="hold" nodeType="withEffect">
+                                  <p:stCondLst>
+                                    <p:cond delay="0"/>
+                                  </p:stCondLst>
+                                  <p:childTnLst>
+                                    <p:set>
+                                      <p:cBhvr>
+                                        <p:cTn id="8" dur="1" fill="hold">
+                                          <p:stCondLst>
+                                            <p:cond delay="0"/>
+                                          </p:stCondLst>
+                                        </p:cTn>
+                                        <p:tgtEl>
+                                          <p:spTgt spid="15"/>
+                                        </p:tgtEl>
+                                        <p:attrNameLst>
+                                          <p:attrName>style.visibility</p:attrName>
+                                        </p:attrNameLst>
+                                      </p:cBhvr>
+                                      <p:to>
+                                        <p:strVal val="visible"/>
+                                      </p:to>
+                                    </p:set>
+                                    <p:animEffect transition="in" filter="wipe(up)">
+                                      <p:cBhvr>
+                                        <p:cTn id="9" dur="250"/>
+                                        <p:tgtEl>
+                                          <p:spTgt spid="15"/>
+                                        </p:tgtEl>
+                                      </p:cBhvr>
+                                    </p:animEffect>
+                                  </p:childTnLst>
+                                </p:cTn>
+                              </p:par>
+                            </p:childTnLst>
+                          </p:cTn>
+                        </p:par>
+                      </p:childTnLst>
+                    </p:cTn>
+                  </p:par>
+                </p:childTnLst>
+              </p:cTn>
+              <p:prevCondLst>
+                <p:cond evt="onPrev" delay="0">
+                  <p:tgtEl>
+                    <p:sldTgt/>
+                  </p:tgtEl>
+                </p:cond>
+              </p:prevCondLst>
+              <p:nextCondLst>
+                <p:cond evt="onNext" delay="0">
+                  <p:tgtEl>
+                    <p:sldTgt/>
+                  </p:tgtEl>
+                </p:cond>
+              </p:nextCondLst>
+            </p:seq>
+          </p:childTnLst>
+        </p:cTn>
       </p:par>
     </p:tnLst>
   </p:timing>
@@ -7992,7 +9195,11 @@
           <a:p>
             <a:r>
               <a:rPr lang="fr-FR" dirty="0" smtClean="0"/>
-              <a:t>MISE EN FORME DES DONNEES</a:t>
+              <a:t>MISE EN FORME DES </a:t>
+            </a:r>
+            <a:r>
+              <a:rPr lang="fr-FR" dirty="0" smtClean="0"/>
+              <a:t>DONNÉES</a:t>
             </a:r>
             <a:endParaRPr lang="fr-FR" dirty="0"/>
           </a:p>
@@ -8086,7 +9293,7 @@
   <p:timing>
     <p:tnLst>
       <p:par>
-        <p:cTn xmlns:p14="http://schemas.microsoft.com/office/powerpoint/2010/main" id="1" dur="indefinite" restart="never" nodeType="tmRoot">
+        <p:cTn id="1" dur="indefinite" restart="never" nodeType="tmRoot">
           <p:childTnLst>
             <p:seq concurrent="1" nextAc="seek">
               <p:cTn id="2" dur="indefinite" nodeType="mainSeq">
@@ -8551,8 +9758,16 @@
           <a:lstStyle/>
           <a:p>
             <a:r>
+              <a:rPr lang="fr-FR" dirty="0"/>
+              <a:t>É</a:t>
+            </a:r>
+            <a:r>
               <a:rPr lang="fr-FR" dirty="0" smtClean="0"/>
-              <a:t>ETAPES DE CONCEPTION</a:t>
+              <a:t>TAPES </a:t>
+            </a:r>
+            <a:r>
+              <a:rPr lang="fr-FR" dirty="0" smtClean="0"/>
+              <a:t>DE CONCEPTION</a:t>
             </a:r>
             <a:endParaRPr lang="fr-FR" dirty="0"/>
           </a:p>
@@ -8754,7 +9969,7 @@
     </p:spTree>
     <p:extLst>
       <p:ext uri="{BB962C8B-B14F-4D97-AF65-F5344CB8AC3E}">
-        <p14:creationId xmlns:p14="http://schemas.microsoft.com/office/powerpoint/2010/main" val="3766399618"/>
+        <p14:creationId xmlns:p14="http://schemas.microsoft.com/office/powerpoint/2010/main" val="1027451656"/>
       </p:ext>
     </p:extLst>
   </p:cSld>
@@ -8764,7 +9979,7 @@
   <p:timing>
     <p:tnLst>
       <p:par>
-        <p:cTn xmlns:p14="http://schemas.microsoft.com/office/powerpoint/2010/main" id="1" dur="indefinite" restart="never" nodeType="tmRoot">
+        <p:cTn id="1" dur="indefinite" restart="never" nodeType="tmRoot">
           <p:childTnLst>
             <p:seq concurrent="1" nextAc="seek">
               <p:cTn id="2" dur="indefinite" nodeType="mainSeq">
@@ -8968,8 +10183,13 @@
           <a:p>
             <a:r>
               <a:rPr lang="fr-FR" dirty="0"/>
-              <a:t>INSTANCE DU PROBLEME</a:t>
-            </a:r>
+              <a:t>INSTANCE DU </a:t>
+            </a:r>
+            <a:r>
+              <a:rPr lang="fr-FR" dirty="0" smtClean="0"/>
+              <a:t>PROBLÈME</a:t>
+            </a:r>
+            <a:endParaRPr lang="fr-FR" dirty="0"/>
           </a:p>
         </p:txBody>
       </p:sp>
@@ -9229,7 +10449,7 @@
   <p:timing>
     <p:tnLst>
       <p:par>
-        <p:cTn xmlns:p14="http://schemas.microsoft.com/office/powerpoint/2010/main" id="1" dur="indefinite" restart="never" nodeType="tmRoot">
+        <p:cTn id="1" dur="indefinite" restart="never" nodeType="tmRoot">
           <p:childTnLst>
             <p:seq concurrent="1" nextAc="seek">
               <p:cTn id="2" dur="indefinite" nodeType="mainSeq">
@@ -9382,8 +10602,13 @@
           <a:p>
             <a:r>
               <a:rPr lang="fr-FR" dirty="0"/>
-              <a:t>INSTANCE DU PROBLEME</a:t>
-            </a:r>
+              <a:t>INSTANCE DU </a:t>
+            </a:r>
+            <a:r>
+              <a:rPr lang="fr-FR" dirty="0" smtClean="0"/>
+              <a:t>PROBLÈME</a:t>
+            </a:r>
+            <a:endParaRPr lang="fr-FR" dirty="0"/>
           </a:p>
         </p:txBody>
       </p:sp>
@@ -11766,7 +12991,7 @@
   <p:timing>
     <p:tnLst>
       <p:par>
-        <p:cTn xmlns:p14="http://schemas.microsoft.com/office/powerpoint/2010/main" id="1" dur="indefinite" restart="never" nodeType="tmRoot">
+        <p:cTn id="1" dur="indefinite" restart="never" nodeType="tmRoot">
           <p:childTnLst>
             <p:seq concurrent="1" nextAc="seek">
               <p:cTn id="2" dur="indefinite" nodeType="mainSeq">
@@ -12355,7 +13580,7 @@
   <p:timing>
     <p:tnLst>
       <p:par>
-        <p:cTn xmlns:p14="http://schemas.microsoft.com/office/powerpoint/2010/main" id="1" dur="indefinite" restart="never" nodeType="tmRoot"/>
+        <p:cTn id="1" dur="indefinite" restart="never" nodeType="tmRoot"/>
       </p:par>
     </p:tnLst>
   </p:timing>

</xml_diff>